<commit_message>
5th Dec. noon regular update
</commit_message>
<xml_diff>
--- a/doc/FunCobal型システム.pptx
+++ b/doc/FunCobal型システム.pptx
@@ -6,8 +6,11 @@
   </p:sldMasterIdLst>
   <p:sldIdLst>
     <p:sldId id="257" r:id="rId2"/>
+    <p:sldId id="258" r:id="rId3"/>
+    <p:sldId id="259" r:id="rId4"/>
+    <p:sldId id="260" r:id="rId5"/>
   </p:sldIdLst>
-  <p:sldSz cx="9144000" cy="6858000" type="screen4x3"/>
+  <p:sldSz cx="12192000" cy="6858000"/>
   <p:notesSz cx="6858000" cy="9144000"/>
   <p:defaultTextStyle>
     <a:defPPr>
@@ -147,8 +150,8 @@
         </p:nvSpPr>
         <p:spPr>
           <a:xfrm>
-            <a:off x="1143000" y="1122363"/>
-            <a:ext cx="6858000" cy="2387600"/>
+            <a:off x="1524000" y="1122363"/>
+            <a:ext cx="9144000" cy="2387600"/>
           </a:xfrm>
         </p:spPr>
         <p:txBody>
@@ -184,8 +187,8 @@
         </p:nvSpPr>
         <p:spPr>
           <a:xfrm>
-            <a:off x="1143000" y="3602038"/>
-            <a:ext cx="6858000" cy="1655762"/>
+            <a:off x="1524000" y="3602038"/>
+            <a:ext cx="9144000" cy="1655762"/>
           </a:xfrm>
         </p:spPr>
         <p:txBody>
@@ -259,7 +262,7 @@
           <a:p>
             <a:fld id="{C8BEEDA0-93FF-46B4-95FA-3B0436B1CA25}" type="datetimeFigureOut">
               <a:rPr kumimoji="1" lang="ja-JP" altLang="en-US" smtClean="0"/>
-              <a:t>2020/6/30</a:t>
+              <a:t>2020/12/5</a:t>
             </a:fld>
             <a:endParaRPr kumimoji="1" lang="ja-JP" altLang="en-US"/>
           </a:p>
@@ -489,7 +492,7 @@
           <a:p>
             <a:fld id="{C8BEEDA0-93FF-46B4-95FA-3B0436B1CA25}" type="datetimeFigureOut">
               <a:rPr kumimoji="1" lang="ja-JP" altLang="en-US" smtClean="0"/>
-              <a:t>2020/6/30</a:t>
+              <a:t>2020/12/5</a:t>
             </a:fld>
             <a:endParaRPr kumimoji="1" lang="ja-JP" altLang="en-US"/>
           </a:p>
@@ -597,8 +600,8 @@
         </p:nvSpPr>
         <p:spPr>
           <a:xfrm>
-            <a:off x="6543675" y="365125"/>
-            <a:ext cx="1971675" cy="5811838"/>
+            <a:off x="8724901" y="365125"/>
+            <a:ext cx="2628900" cy="5811838"/>
           </a:xfrm>
         </p:spPr>
         <p:txBody>
@@ -630,8 +633,8 @@
         </p:nvSpPr>
         <p:spPr>
           <a:xfrm>
-            <a:off x="628650" y="365125"/>
-            <a:ext cx="5800725" cy="5811838"/>
+            <a:off x="838201" y="365125"/>
+            <a:ext cx="7734300" cy="5811838"/>
           </a:xfrm>
         </p:spPr>
         <p:txBody>
@@ -729,7 +732,7 @@
           <a:p>
             <a:fld id="{C8BEEDA0-93FF-46B4-95FA-3B0436B1CA25}" type="datetimeFigureOut">
               <a:rPr kumimoji="1" lang="ja-JP" altLang="en-US" smtClean="0"/>
-              <a:t>2020/6/30</a:t>
+              <a:t>2020/12/5</a:t>
             </a:fld>
             <a:endParaRPr kumimoji="1" lang="ja-JP" altLang="en-US"/>
           </a:p>
@@ -959,7 +962,7 @@
           <a:p>
             <a:fld id="{C8BEEDA0-93FF-46B4-95FA-3B0436B1CA25}" type="datetimeFigureOut">
               <a:rPr kumimoji="1" lang="ja-JP" altLang="en-US" smtClean="0"/>
-              <a:t>2020/6/30</a:t>
+              <a:t>2020/12/5</a:t>
             </a:fld>
             <a:endParaRPr kumimoji="1" lang="ja-JP" altLang="en-US"/>
           </a:p>
@@ -1067,8 +1070,8 @@
         </p:nvSpPr>
         <p:spPr>
           <a:xfrm>
-            <a:off x="623888" y="1709739"/>
-            <a:ext cx="7886700" cy="2852737"/>
+            <a:off x="831851" y="1709740"/>
+            <a:ext cx="10515600" cy="2852737"/>
           </a:xfrm>
         </p:spPr>
         <p:txBody>
@@ -1104,8 +1107,8 @@
         </p:nvSpPr>
         <p:spPr>
           <a:xfrm>
-            <a:off x="623888" y="4589464"/>
-            <a:ext cx="7886700" cy="1500187"/>
+            <a:off x="831851" y="4589465"/>
+            <a:ext cx="10515600" cy="1500187"/>
           </a:xfrm>
         </p:spPr>
         <p:txBody>
@@ -1234,7 +1237,7 @@
           <a:p>
             <a:fld id="{C8BEEDA0-93FF-46B4-95FA-3B0436B1CA25}" type="datetimeFigureOut">
               <a:rPr kumimoji="1" lang="ja-JP" altLang="en-US" smtClean="0"/>
-              <a:t>2020/6/30</a:t>
+              <a:t>2020/12/5</a:t>
             </a:fld>
             <a:endParaRPr kumimoji="1" lang="ja-JP" altLang="en-US"/>
           </a:p>
@@ -1370,8 +1373,8 @@
         </p:nvSpPr>
         <p:spPr>
           <a:xfrm>
-            <a:off x="628650" y="1825625"/>
-            <a:ext cx="3886200" cy="4351338"/>
+            <a:off x="838200" y="1825625"/>
+            <a:ext cx="5181600" cy="4351338"/>
           </a:xfrm>
         </p:spPr>
         <p:txBody>
@@ -1464,8 +1467,8 @@
         </p:nvSpPr>
         <p:spPr>
           <a:xfrm>
-            <a:off x="4629150" y="1825625"/>
-            <a:ext cx="3886200" cy="4351338"/>
+            <a:off x="6172200" y="1825625"/>
+            <a:ext cx="5181600" cy="4351338"/>
           </a:xfrm>
         </p:spPr>
         <p:txBody>
@@ -1563,7 +1566,7 @@
           <a:p>
             <a:fld id="{C8BEEDA0-93FF-46B4-95FA-3B0436B1CA25}" type="datetimeFigureOut">
               <a:rPr kumimoji="1" lang="ja-JP" altLang="en-US" smtClean="0"/>
-              <a:t>2020/6/30</a:t>
+              <a:t>2020/12/5</a:t>
             </a:fld>
             <a:endParaRPr kumimoji="1" lang="ja-JP" altLang="en-US"/>
           </a:p>
@@ -1671,8 +1674,8 @@
         </p:nvSpPr>
         <p:spPr>
           <a:xfrm>
-            <a:off x="629841" y="365126"/>
-            <a:ext cx="7886700" cy="1325563"/>
+            <a:off x="839788" y="365127"/>
+            <a:ext cx="10515600" cy="1325563"/>
           </a:xfrm>
         </p:spPr>
         <p:txBody>
@@ -1704,8 +1707,8 @@
         </p:nvSpPr>
         <p:spPr>
           <a:xfrm>
-            <a:off x="629842" y="1681163"/>
-            <a:ext cx="3868340" cy="823912"/>
+            <a:off x="839789" y="1681163"/>
+            <a:ext cx="5157787" cy="823912"/>
           </a:xfrm>
         </p:spPr>
         <p:txBody>
@@ -1775,8 +1778,8 @@
         </p:nvSpPr>
         <p:spPr>
           <a:xfrm>
-            <a:off x="629842" y="2505075"/>
-            <a:ext cx="3868340" cy="3684588"/>
+            <a:off x="839789" y="2505075"/>
+            <a:ext cx="5157787" cy="3684588"/>
           </a:xfrm>
         </p:spPr>
         <p:txBody>
@@ -1869,8 +1872,8 @@
         </p:nvSpPr>
         <p:spPr>
           <a:xfrm>
-            <a:off x="4629150" y="1681163"/>
-            <a:ext cx="3887391" cy="823912"/>
+            <a:off x="6172201" y="1681163"/>
+            <a:ext cx="5183188" cy="823912"/>
           </a:xfrm>
         </p:spPr>
         <p:txBody>
@@ -1940,8 +1943,8 @@
         </p:nvSpPr>
         <p:spPr>
           <a:xfrm>
-            <a:off x="4629150" y="2505075"/>
-            <a:ext cx="3887391" cy="3684588"/>
+            <a:off x="6172201" y="2505075"/>
+            <a:ext cx="5183188" cy="3684588"/>
           </a:xfrm>
         </p:spPr>
         <p:txBody>
@@ -2039,7 +2042,7 @@
           <a:p>
             <a:fld id="{C8BEEDA0-93FF-46B4-95FA-3B0436B1CA25}" type="datetimeFigureOut">
               <a:rPr kumimoji="1" lang="ja-JP" altLang="en-US" smtClean="0"/>
-              <a:t>2020/6/30</a:t>
+              <a:t>2020/12/5</a:t>
             </a:fld>
             <a:endParaRPr kumimoji="1" lang="ja-JP" altLang="en-US"/>
           </a:p>
@@ -2180,7 +2183,7 @@
           <a:p>
             <a:fld id="{C8BEEDA0-93FF-46B4-95FA-3B0436B1CA25}" type="datetimeFigureOut">
               <a:rPr kumimoji="1" lang="ja-JP" altLang="en-US" smtClean="0"/>
-              <a:t>2020/6/30</a:t>
+              <a:t>2020/12/5</a:t>
             </a:fld>
             <a:endParaRPr kumimoji="1" lang="ja-JP" altLang="en-US"/>
           </a:p>
@@ -2293,7 +2296,7 @@
           <a:p>
             <a:fld id="{C8BEEDA0-93FF-46B4-95FA-3B0436B1CA25}" type="datetimeFigureOut">
               <a:rPr kumimoji="1" lang="ja-JP" altLang="en-US" smtClean="0"/>
-              <a:t>2020/6/30</a:t>
+              <a:t>2020/12/5</a:t>
             </a:fld>
             <a:endParaRPr kumimoji="1" lang="ja-JP" altLang="en-US"/>
           </a:p>
@@ -2401,8 +2404,8 @@
         </p:nvSpPr>
         <p:spPr>
           <a:xfrm>
-            <a:off x="629841" y="457200"/>
-            <a:ext cx="2949178" cy="1600200"/>
+            <a:off x="839788" y="457200"/>
+            <a:ext cx="3932237" cy="1600200"/>
           </a:xfrm>
         </p:spPr>
         <p:txBody>
@@ -2438,8 +2441,8 @@
         </p:nvSpPr>
         <p:spPr>
           <a:xfrm>
-            <a:off x="3887391" y="987426"/>
-            <a:ext cx="4629150" cy="4873625"/>
+            <a:off x="5183188" y="987427"/>
+            <a:ext cx="6172200" cy="4873625"/>
           </a:xfrm>
         </p:spPr>
         <p:txBody>
@@ -2560,8 +2563,8 @@
         </p:nvSpPr>
         <p:spPr>
           <a:xfrm>
-            <a:off x="629841" y="2057400"/>
-            <a:ext cx="2949178" cy="3811588"/>
+            <a:off x="839788" y="2057400"/>
+            <a:ext cx="3932237" cy="3811588"/>
           </a:xfrm>
         </p:spPr>
         <p:txBody>
@@ -2636,7 +2639,7 @@
           <a:p>
             <a:fld id="{C8BEEDA0-93FF-46B4-95FA-3B0436B1CA25}" type="datetimeFigureOut">
               <a:rPr kumimoji="1" lang="ja-JP" altLang="en-US" smtClean="0"/>
-              <a:t>2020/6/30</a:t>
+              <a:t>2020/12/5</a:t>
             </a:fld>
             <a:endParaRPr kumimoji="1" lang="ja-JP" altLang="en-US"/>
           </a:p>
@@ -2744,8 +2747,8 @@
         </p:nvSpPr>
         <p:spPr>
           <a:xfrm>
-            <a:off x="629841" y="457200"/>
-            <a:ext cx="2949178" cy="1600200"/>
+            <a:off x="839788" y="457200"/>
+            <a:ext cx="3932237" cy="1600200"/>
           </a:xfrm>
         </p:spPr>
         <p:txBody>
@@ -2781,8 +2784,8 @@
         </p:nvSpPr>
         <p:spPr>
           <a:xfrm>
-            <a:off x="3887391" y="987426"/>
-            <a:ext cx="4629150" cy="4873625"/>
+            <a:off x="5183188" y="987427"/>
+            <a:ext cx="6172200" cy="4873625"/>
           </a:xfrm>
         </p:spPr>
         <p:txBody>
@@ -2848,8 +2851,8 @@
         </p:nvSpPr>
         <p:spPr>
           <a:xfrm>
-            <a:off x="629841" y="2057400"/>
-            <a:ext cx="2949178" cy="3811588"/>
+            <a:off x="839788" y="2057400"/>
+            <a:ext cx="3932237" cy="3811588"/>
           </a:xfrm>
         </p:spPr>
         <p:txBody>
@@ -2924,7 +2927,7 @@
           <a:p>
             <a:fld id="{C8BEEDA0-93FF-46B4-95FA-3B0436B1CA25}" type="datetimeFigureOut">
               <a:rPr kumimoji="1" lang="ja-JP" altLang="en-US" smtClean="0"/>
-              <a:t>2020/6/30</a:t>
+              <a:t>2020/12/5</a:t>
             </a:fld>
             <a:endParaRPr kumimoji="1" lang="ja-JP" altLang="en-US"/>
           </a:p>
@@ -3037,8 +3040,8 @@
         </p:nvSpPr>
         <p:spPr>
           <a:xfrm>
-            <a:off x="628650" y="365126"/>
-            <a:ext cx="7886700" cy="1325563"/>
+            <a:off x="838200" y="365127"/>
+            <a:ext cx="10515600" cy="1325563"/>
           </a:xfrm>
           <a:prstGeom prst="rect">
             <a:avLst/>
@@ -3075,8 +3078,8 @@
         </p:nvSpPr>
         <p:spPr>
           <a:xfrm>
-            <a:off x="628650" y="1825625"/>
-            <a:ext cx="7886700" cy="4351338"/>
+            <a:off x="838200" y="1825625"/>
+            <a:ext cx="10515600" cy="4351338"/>
           </a:xfrm>
           <a:prstGeom prst="rect">
             <a:avLst/>
@@ -3174,8 +3177,8 @@
         </p:nvSpPr>
         <p:spPr>
           <a:xfrm>
-            <a:off x="628650" y="6356351"/>
-            <a:ext cx="2057400" cy="365125"/>
+            <a:off x="838200" y="6356352"/>
+            <a:ext cx="2743200" cy="365125"/>
           </a:xfrm>
           <a:prstGeom prst="rect">
             <a:avLst/>
@@ -3197,7 +3200,7 @@
           <a:p>
             <a:fld id="{C8BEEDA0-93FF-46B4-95FA-3B0436B1CA25}" type="datetimeFigureOut">
               <a:rPr kumimoji="1" lang="ja-JP" altLang="en-US" smtClean="0"/>
-              <a:t>2020/6/30</a:t>
+              <a:t>2020/12/5</a:t>
             </a:fld>
             <a:endParaRPr kumimoji="1" lang="ja-JP" altLang="en-US"/>
           </a:p>
@@ -3221,8 +3224,8 @@
         </p:nvSpPr>
         <p:spPr>
           <a:xfrm>
-            <a:off x="3028950" y="6356351"/>
-            <a:ext cx="3086100" cy="365125"/>
+            <a:off x="4038600" y="6356352"/>
+            <a:ext cx="4114800" cy="365125"/>
           </a:xfrm>
           <a:prstGeom prst="rect">
             <a:avLst/>
@@ -3264,8 +3267,8 @@
         </p:nvSpPr>
         <p:spPr>
           <a:xfrm>
-            <a:off x="6457950" y="6356351"/>
-            <a:ext cx="2057400" cy="365125"/>
+            <a:off x="8610600" y="6356352"/>
+            <a:ext cx="2743200" cy="365125"/>
           </a:xfrm>
           <a:prstGeom prst="rect">
             <a:avLst/>
@@ -3630,8 +3633,8 @@
             </p:nvSpPr>
             <p:spPr>
               <a:xfrm>
-                <a:off x="162560" y="218878"/>
-                <a:ext cx="8900159" cy="6415795"/>
+                <a:off x="1686561" y="218879"/>
+                <a:ext cx="2962477" cy="797719"/>
               </a:xfrm>
               <a:prstGeom prst="rect">
                 <a:avLst/>
@@ -3652,7 +3655,7 @@
                     </m:oMathParaPr>
                     <m:oMath xmlns:m="http://schemas.openxmlformats.org/officeDocument/2006/math">
                       <m:r>
-                        <a:rPr lang="ja-JP" altLang="en-US" sz="1400" i="1" smtClean="0">
+                        <a:rPr lang="ja-JP" altLang="en-US" sz="1400" i="1">
                           <a:latin typeface="Cambria Math" panose="02040503050406030204" pitchFamily="18" charset="0"/>
                         </a:rPr>
                         <m:t>全称型</m:t>
@@ -3689,6 +3692,202 @@
                                 </a:rPr>
                                 <m:t>数系型</m:t>
                               </m:r>
+                            </m:e>
+                            <m:e>
+                              <m:r>
+                                <a:rPr lang="en-US" altLang="ja-JP" sz="1400" i="1">
+                                  <a:latin typeface="Cambria Math" panose="02040503050406030204" pitchFamily="18" charset="0"/>
+                                </a:rPr>
+                                <m:t>𝐶𝑐𝑜𝑑𝑒</m:t>
+                              </m:r>
+                              <m:r>
+                                <a:rPr lang="ja-JP" altLang="en-US" sz="1400" i="1">
+                                  <a:latin typeface="Cambria Math" panose="02040503050406030204" pitchFamily="18" charset="0"/>
+                                </a:rPr>
+                                <m:t>文字型</m:t>
+                              </m:r>
+                            </m:e>
+                            <m:e>
+                              <m:r>
+                                <a:rPr lang="en-US" altLang="ja-JP" sz="1400" i="1">
+                                  <a:latin typeface="Cambria Math" panose="02040503050406030204" pitchFamily="18" charset="0"/>
+                                </a:rPr>
+                                <m:t>𝑆𝑦𝑠</m:t>
+                              </m:r>
+                              <m:r>
+                                <a:rPr lang="ja-JP" altLang="en-US" sz="1400" i="1">
+                                  <a:latin typeface="Cambria Math" panose="02040503050406030204" pitchFamily="18" charset="0"/>
+                                </a:rPr>
+                                <m:t>算系型</m:t>
+                              </m:r>
+                            </m:e>
+                          </m:eqArr>
+                        </m:e>
+                      </m:d>
+                    </m:oMath>
+                  </m:oMathPara>
+                </a14:m>
+                <a:endParaRPr lang="ja-JP" altLang="en-US" sz="1400" dirty="0"/>
+              </a:p>
+            </p:txBody>
+          </p:sp>
+        </mc:Choice>
+        <mc:Fallback>
+          <p:sp>
+            <p:nvSpPr>
+              <p:cNvPr id="2" name="テキスト ボックス 1">
+                <a:extLst>
+                  <a:ext uri="{FF2B5EF4-FFF2-40B4-BE49-F238E27FC236}">
+                    <a16:creationId xmlns:a16="http://schemas.microsoft.com/office/drawing/2014/main" id="{F11CC1F2-89DF-4D48-8996-97FF02999196}"/>
+                  </a:ext>
+                </a:extLst>
+              </p:cNvPr>
+              <p:cNvSpPr txBox="1">
+                <a:spLocks noRot="1" noChangeAspect="1" noMove="1" noResize="1" noEditPoints="1" noAdjustHandles="1" noChangeArrowheads="1" noChangeShapeType="1" noTextEdit="1"/>
+              </p:cNvSpPr>
+              <p:nvPr/>
+            </p:nvSpPr>
+            <p:spPr>
+              <a:xfrm>
+                <a:off x="1686561" y="218879"/>
+                <a:ext cx="2962477" cy="797719"/>
+              </a:xfrm>
+              <a:prstGeom prst="rect">
+                <a:avLst/>
+              </a:prstGeom>
+              <a:blipFill>
+                <a:blip r:embed="rId2"/>
+                <a:stretch>
+                  <a:fillRect/>
+                </a:stretch>
+              </a:blipFill>
+            </p:spPr>
+            <p:txBody>
+              <a:bodyPr/>
+              <a:lstStyle/>
+              <a:p>
+                <a:r>
+                  <a:rPr lang="ja-JP" altLang="en-US">
+                    <a:noFill/>
+                  </a:rPr>
+                  <a:t> </a:t>
+                </a:r>
+              </a:p>
+            </p:txBody>
+          </p:sp>
+        </mc:Fallback>
+      </mc:AlternateContent>
+    </p:spTree>
+    <p:extLst>
+      <p:ext uri="{BB962C8B-B14F-4D97-AF65-F5344CB8AC3E}">
+        <p14:creationId xmlns:p14="http://schemas.microsoft.com/office/powerpoint/2010/main" val="1265455521"/>
+      </p:ext>
+    </p:extLst>
+  </p:cSld>
+  <p:clrMapOvr>
+    <a:masterClrMapping/>
+  </p:clrMapOvr>
+</p:sld>
+</file>
+
+<file path=ppt/slides/slide2.xml><?xml version="1.0" encoding="utf-8"?>
+<p:sld xmlns:a="http://schemas.openxmlformats.org/drawingml/2006/main" xmlns:r="http://schemas.openxmlformats.org/officeDocument/2006/relationships" xmlns:p="http://schemas.openxmlformats.org/presentationml/2006/main">
+  <p:cSld>
+    <p:spTree>
+      <p:nvGrpSpPr>
+        <p:cNvPr id="1" name=""/>
+        <p:cNvGrpSpPr/>
+        <p:nvPr/>
+      </p:nvGrpSpPr>
+      <p:grpSpPr>
+        <a:xfrm>
+          <a:off x="0" y="0"/>
+          <a:ext cx="0" cy="0"/>
+          <a:chOff x="0" y="0"/>
+          <a:chExt cx="0" cy="0"/>
+        </a:xfrm>
+      </p:grpSpPr>
+      <mc:AlternateContent xmlns:mc="http://schemas.openxmlformats.org/markup-compatibility/2006">
+        <mc:Choice xmlns:a14="http://schemas.microsoft.com/office/drawing/2010/main" Requires="a14">
+          <p:sp>
+            <p:nvSpPr>
+              <p:cNvPr id="2" name="テキスト ボックス 1">
+                <a:extLst>
+                  <a:ext uri="{FF2B5EF4-FFF2-40B4-BE49-F238E27FC236}">
+                    <a16:creationId xmlns:a16="http://schemas.microsoft.com/office/drawing/2014/main" id="{F11CC1F2-89DF-4D48-8996-97FF02999196}"/>
+                  </a:ext>
+                </a:extLst>
+              </p:cNvPr>
+              <p:cNvSpPr txBox="1"/>
+              <p:nvPr/>
+            </p:nvSpPr>
+            <p:spPr>
+              <a:xfrm>
+                <a:off x="1686561" y="218879"/>
+                <a:ext cx="7825880" cy="2264915"/>
+              </a:xfrm>
+              <a:prstGeom prst="rect">
+                <a:avLst/>
+              </a:prstGeom>
+              <a:noFill/>
+            </p:spPr>
+            <p:txBody>
+              <a:bodyPr wrap="square" lIns="0" tIns="0" rIns="0" bIns="0" rtlCol="0">
+                <a:spAutoFit/>
+              </a:bodyPr>
+              <a:lstStyle/>
+              <a:p>
+                <a:pPr/>
+                <a14:m>
+                  <m:oMathPara xmlns:m="http://schemas.openxmlformats.org/officeDocument/2006/math">
+                    <m:oMathParaPr>
+                      <m:jc m:val="left"/>
+                    </m:oMathParaPr>
+                    <m:oMath xmlns:m="http://schemas.openxmlformats.org/officeDocument/2006/math">
+                      <m:r>
+                        <a:rPr lang="en-US" altLang="ja-JP" sz="1400" i="1">
+                          <a:latin typeface="Cambria Math" panose="02040503050406030204" pitchFamily="18" charset="0"/>
+                        </a:rPr>
+                        <m:t>𝑁𝑢𝑠</m:t>
+                      </m:r>
+                      <m:r>
+                        <a:rPr lang="ja-JP" altLang="en-US" sz="1400" i="1">
+                          <a:latin typeface="Cambria Math" panose="02040503050406030204" pitchFamily="18" charset="0"/>
+                        </a:rPr>
+                        <m:t>数系型</m:t>
+                      </m:r>
+                      <m:d>
+                        <m:dPr>
+                          <m:begChr m:val="{"/>
+                          <m:endChr m:val=""/>
+                          <m:ctrlPr>
+                            <a:rPr lang="en-US" altLang="ja-JP" sz="1400" i="1">
+                              <a:latin typeface="Cambria Math" panose="02040503050406030204" pitchFamily="18" charset="0"/>
+                            </a:rPr>
+                          </m:ctrlPr>
+                        </m:dPr>
+                        <m:e>
+                          <m:eqArr>
+                            <m:eqArrPr>
+                              <m:ctrlPr>
+                                <a:rPr lang="en-US" altLang="ja-JP" sz="1400" i="1">
+                                  <a:latin typeface="Cambria Math" panose="02040503050406030204" pitchFamily="18" charset="0"/>
+                                </a:rPr>
+                              </m:ctrlPr>
+                            </m:eqArrPr>
+                            <m:e>
+                              <m:r>
+                                <a:rPr lang="en-US" altLang="ja-JP" sz="1400" i="1">
+                                  <a:latin typeface="Cambria Math" panose="02040503050406030204" pitchFamily="18" charset="0"/>
+                                </a:rPr>
+                                <m:t>𝐶𝑜𝑚𝑝𝑙𝑒𝑥</m:t>
+                              </m:r>
+                              <m:r>
+                                <a:rPr lang="ja-JP" altLang="en-US" sz="1400" i="1">
+                                  <a:latin typeface="Cambria Math" panose="02040503050406030204" pitchFamily="18" charset="0"/>
+                                </a:rPr>
+                                <m:t>複素数型</m:t>
+                              </m:r>
                               <m:d>
                                 <m:dPr>
                                   <m:begChr m:val="{"/>
@@ -3713,13 +3912,13 @@
                                         <a:rPr lang="en-US" altLang="ja-JP" sz="1400" i="1">
                                           <a:latin typeface="Cambria Math" panose="02040503050406030204" pitchFamily="18" charset="0"/>
                                         </a:rPr>
-                                        <m:t>𝐶𝑜𝑚𝑝𝑙𝑒𝑥</m:t>
+                                        <m:t>𝑅𝑒𝑎𝑙𝑠</m:t>
                                       </m:r>
                                       <m:r>
                                         <a:rPr lang="ja-JP" altLang="en-US" sz="1400" i="1">
                                           <a:latin typeface="Cambria Math" panose="02040503050406030204" pitchFamily="18" charset="0"/>
                                         </a:rPr>
-                                        <m:t>複素数型</m:t>
+                                        <m:t>実数型</m:t>
                                       </m:r>
                                       <m:d>
                                         <m:dPr>
@@ -3745,13 +3944,13 @@
                                                 <a:rPr lang="en-US" altLang="ja-JP" sz="1400" i="1">
                                                   <a:latin typeface="Cambria Math" panose="02040503050406030204" pitchFamily="18" charset="0"/>
                                                 </a:rPr>
-                                                <m:t>𝑅𝑒𝑎𝑙𝑠</m:t>
+                                                <m:t>𝑁𝑢𝑚</m:t>
                                               </m:r>
                                               <m:r>
                                                 <a:rPr lang="ja-JP" altLang="en-US" sz="1400" i="1">
                                                   <a:latin typeface="Cambria Math" panose="02040503050406030204" pitchFamily="18" charset="0"/>
                                                 </a:rPr>
-                                                <m:t>実数型</m:t>
+                                                <m:t>数値型</m:t>
                                               </m:r>
                                               <m:d>
                                                 <m:dPr>
@@ -3777,91 +3976,41 @@
                                                         <a:rPr lang="en-US" altLang="ja-JP" sz="1400" i="1">
                                                           <a:latin typeface="Cambria Math" panose="02040503050406030204" pitchFamily="18" charset="0"/>
                                                         </a:rPr>
-                                                        <m:t>𝑁𝑢𝑚</m:t>
+                                                        <m:t>𝐼𝑛𝑡</m:t>
                                                       </m:r>
                                                       <m:r>
                                                         <a:rPr lang="ja-JP" altLang="en-US" sz="1400" i="1">
                                                           <a:latin typeface="Cambria Math" panose="02040503050406030204" pitchFamily="18" charset="0"/>
                                                         </a:rPr>
-                                                        <m:t>数値型</m:t>
+                                                        <m:t>整数型</m:t>
                                                       </m:r>
-                                                      <m:d>
-                                                        <m:dPr>
-                                                          <m:begChr m:val="{"/>
-                                                          <m:endChr m:val=""/>
-                                                          <m:ctrlPr>
-                                                            <a:rPr lang="en-US" altLang="ja-JP" sz="1400" i="1">
-                                                              <a:latin typeface="Cambria Math" panose="02040503050406030204" pitchFamily="18" charset="0"/>
-                                                            </a:rPr>
-                                                          </m:ctrlPr>
-                                                        </m:dPr>
-                                                        <m:e>
-                                                          <m:eqArr>
-                                                            <m:eqArrPr>
-                                                              <m:ctrlPr>
-                                                                <a:rPr lang="en-US" altLang="ja-JP" sz="1400" i="1">
-                                                                  <a:latin typeface="Cambria Math" panose="02040503050406030204" pitchFamily="18" charset="0"/>
-                                                                </a:rPr>
-                                                              </m:ctrlPr>
-                                                            </m:eqArrPr>
-                                                            <m:e>
-                                                              <m:r>
-                                                                <a:rPr lang="en-US" altLang="ja-JP" sz="1400" i="1">
-                                                                  <a:latin typeface="Cambria Math" panose="02040503050406030204" pitchFamily="18" charset="0"/>
-                                                                </a:rPr>
-                                                                <m:t>𝐼𝑛𝑡</m:t>
-                                                              </m:r>
-                                                              <m:r>
-                                                                <a:rPr lang="ja-JP" altLang="en-US" sz="1400" i="1">
-                                                                  <a:latin typeface="Cambria Math" panose="02040503050406030204" pitchFamily="18" charset="0"/>
-                                                                </a:rPr>
-                                                                <m:t>整数型</m:t>
-                                                              </m:r>
-                                                            </m:e>
-                                                            <m:e>
-                                                              <m:r>
-                                                                <a:rPr lang="en-US" altLang="ja-JP" sz="1400" i="1">
-                                                                  <a:latin typeface="Cambria Math" panose="02040503050406030204" pitchFamily="18" charset="0"/>
-                                                                </a:rPr>
-                                                                <m:t>𝐹𝑟𝑜𝑎𝑡</m:t>
-                                                              </m:r>
-                                                              <m:r>
-                                                                <a:rPr lang="ja-JP" altLang="en-US" sz="1400" i="1">
-                                                                  <a:latin typeface="Cambria Math" panose="02040503050406030204" pitchFamily="18" charset="0"/>
-                                                                </a:rPr>
-                                                                <m:t>単精度小数点数型</m:t>
-                                                              </m:r>
-                                                            </m:e>
-                                                            <m:e>
-                                                              <m:r>
-                                                                <a:rPr lang="en-US" altLang="ja-JP" sz="1400" i="1">
-                                                                  <a:latin typeface="Cambria Math" panose="02040503050406030204" pitchFamily="18" charset="0"/>
-                                                                </a:rPr>
-                                                                <m:t>𝐷𝑜𝑢𝑏𝑙𝑒</m:t>
-                                                              </m:r>
-                                                              <m:r>
-                                                                <a:rPr lang="ja-JP" altLang="en-US" sz="1400" i="1">
-                                                                  <a:latin typeface="Cambria Math" panose="02040503050406030204" pitchFamily="18" charset="0"/>
-                                                                </a:rPr>
-                                                                <m:t>倍精度小数点数型</m:t>
-                                                              </m:r>
-                                                            </m:e>
-                                                          </m:eqArr>
-                                                        </m:e>
-                                                      </m:d>
                                                     </m:e>
                                                     <m:e>
                                                       <m:r>
                                                         <a:rPr lang="en-US" altLang="ja-JP" sz="1400" i="1">
                                                           <a:latin typeface="Cambria Math" panose="02040503050406030204" pitchFamily="18" charset="0"/>
                                                         </a:rPr>
-                                                        <m:t>𝐹𝑟𝑎𝑐</m:t>
+                                                        <m:t>𝐹𝑟𝑜𝑎𝑡</m:t>
                                                       </m:r>
                                                       <m:r>
                                                         <a:rPr lang="ja-JP" altLang="en-US" sz="1400" i="1">
                                                           <a:latin typeface="Cambria Math" panose="02040503050406030204" pitchFamily="18" charset="0"/>
                                                         </a:rPr>
-                                                        <m:t>有理数型</m:t>
+                                                        <m:t>単精度小数点数型</m:t>
+                                                      </m:r>
+                                                    </m:e>
+                                                    <m:e>
+                                                      <m:r>
+                                                        <a:rPr lang="en-US" altLang="ja-JP" sz="1400" i="1">
+                                                          <a:latin typeface="Cambria Math" panose="02040503050406030204" pitchFamily="18" charset="0"/>
+                                                        </a:rPr>
+                                                        <m:t>𝐷𝑜𝑢𝑏𝑙𝑒</m:t>
+                                                      </m:r>
+                                                      <m:r>
+                                                        <a:rPr lang="ja-JP" altLang="en-US" sz="1400" i="1">
+                                                          <a:latin typeface="Cambria Math" panose="02040503050406030204" pitchFamily="18" charset="0"/>
+                                                        </a:rPr>
+                                                        <m:t>倍精度小数点数型</m:t>
                                                       </m:r>
                                                     </m:e>
                                                   </m:eqArr>
@@ -3873,13 +4022,13 @@
                                                 <a:rPr lang="en-US" altLang="ja-JP" sz="1400" i="1">
                                                   <a:latin typeface="Cambria Math" panose="02040503050406030204" pitchFamily="18" charset="0"/>
                                                 </a:rPr>
-                                                <m:t>𝐼𝑚𝑎𝑔𝑖𝑛</m:t>
+                                                <m:t>𝐹𝑟𝑎𝑐</m:t>
                                               </m:r>
                                               <m:r>
                                                 <a:rPr lang="ja-JP" altLang="en-US" sz="1400" i="1">
                                                   <a:latin typeface="Cambria Math" panose="02040503050406030204" pitchFamily="18" charset="0"/>
                                                 </a:rPr>
-                                                <m:t>純虚数型</m:t>
+                                                <m:t>有理数型</m:t>
                                               </m:r>
                                             </m:e>
                                           </m:eqArr>
@@ -3891,95 +4040,14 @@
                                         <a:rPr lang="en-US" altLang="ja-JP" sz="1400" i="1">
                                           <a:latin typeface="Cambria Math" panose="02040503050406030204" pitchFamily="18" charset="0"/>
                                         </a:rPr>
-                                        <m:t>𝑄𝑢𝑎𝑡</m:t>
+                                        <m:t>𝐼𝑚𝑎𝑔𝑖𝑛</m:t>
                                       </m:r>
                                       <m:r>
                                         <a:rPr lang="ja-JP" altLang="en-US" sz="1400" i="1">
                                           <a:latin typeface="Cambria Math" panose="02040503050406030204" pitchFamily="18" charset="0"/>
                                         </a:rPr>
-                                        <m:t>四元数型</m:t>
+                                        <m:t>純虚数型</m:t>
                                       </m:r>
-                                    </m:e>
-                                    <m:e>
-                                      <m:r>
-                                        <a:rPr lang="en-US" altLang="ja-JP" sz="1400" i="1">
-                                          <a:latin typeface="Cambria Math" panose="02040503050406030204" pitchFamily="18" charset="0"/>
-                                        </a:rPr>
-                                        <m:t>𝐴𝑥𝑖𝑙𝑛</m:t>
-                                      </m:r>
-                                      <m:r>
-                                        <a:rPr lang="ja-JP" altLang="en-US" sz="1400" i="1">
-                                          <a:latin typeface="Cambria Math" panose="02040503050406030204" pitchFamily="18" charset="0"/>
-                                        </a:rPr>
-                                        <m:t>補助数型</m:t>
-                                      </m:r>
-                                      <m:d>
-                                        <m:dPr>
-                                          <m:begChr m:val="{"/>
-                                          <m:endChr m:val=""/>
-                                          <m:ctrlPr>
-                                            <a:rPr lang="en-US" altLang="ja-JP" sz="1400" i="1">
-                                              <a:latin typeface="Cambria Math" panose="02040503050406030204" pitchFamily="18" charset="0"/>
-                                            </a:rPr>
-                                          </m:ctrlPr>
-                                        </m:dPr>
-                                        <m:e>
-                                          <m:eqArr>
-                                            <m:eqArrPr>
-                                              <m:ctrlPr>
-                                                <a:rPr lang="en-US" altLang="ja-JP" sz="1400" i="1">
-                                                  <a:latin typeface="Cambria Math" panose="02040503050406030204" pitchFamily="18" charset="0"/>
-                                                </a:rPr>
-                                              </m:ctrlPr>
-                                            </m:eqArrPr>
-                                            <m:e>
-                                              <m:r>
-                                                <m:rPr>
-                                                  <m:sty m:val="p"/>
-                                                </m:rPr>
-                                                <a:rPr lang="en-US" altLang="ja-JP" sz="1400" i="1">
-                                                  <a:latin typeface="Cambria Math" panose="02040503050406030204" pitchFamily="18" charset="0"/>
-                                                </a:rPr>
-                                                <m:t>Vector</m:t>
-                                              </m:r>
-                                              <m:r>
-                                                <a:rPr lang="ja-JP" altLang="en-US" sz="1400" i="1">
-                                                  <a:latin typeface="Cambria Math" panose="02040503050406030204" pitchFamily="18" charset="0"/>
-                                                </a:rPr>
-                                                <m:t>向量型</m:t>
-                                              </m:r>
-                                            </m:e>
-                                            <m:e>
-                                              <m:r>
-                                                <a:rPr lang="en-US" altLang="ja-JP" sz="1400" i="1">
-                                                  <a:latin typeface="Cambria Math" panose="02040503050406030204" pitchFamily="18" charset="0"/>
-                                                </a:rPr>
-                                                <m:t>𝑀𝑎𝑡𝑟𝑖𝑥</m:t>
-                                              </m:r>
-                                              <m:r>
-                                                <a:rPr lang="ja-JP" altLang="en-US" sz="1400" i="1">
-                                                  <a:latin typeface="Cambria Math" panose="02040503050406030204" pitchFamily="18" charset="0"/>
-                                                </a:rPr>
-                                                <m:t>行列型</m:t>
-                                              </m:r>
-                                            </m:e>
-                                            <m:e>
-                                              <m:r>
-                                                <a:rPr lang="en-US" altLang="ja-JP" sz="1400" i="1">
-                                                  <a:latin typeface="Cambria Math" panose="02040503050406030204" pitchFamily="18" charset="0"/>
-                                                </a:rPr>
-                                                <m:t>𝐼𝑡𝑣</m:t>
-                                              </m:r>
-                                              <m:r>
-                                                <a:rPr lang="ja-JP" altLang="en-US" sz="1400" i="1">
-                                                  <a:latin typeface="Cambria Math" panose="02040503050406030204" pitchFamily="18" charset="0"/>
-                                                </a:rPr>
-                                                <m:t>区間型</m:t>
-                                              </m:r>
-                                            </m:e>
-                                          </m:eqArr>
-                                        </m:e>
-                                      </m:d>
                                     </m:e>
                                   </m:eqArr>
                                 </m:e>
@@ -3990,13 +4058,27 @@
                                 <a:rPr lang="en-US" altLang="ja-JP" sz="1400" i="1">
                                   <a:latin typeface="Cambria Math" panose="02040503050406030204" pitchFamily="18" charset="0"/>
                                 </a:rPr>
-                                <m:t>𝐶𝑐𝑜𝑑𝑒</m:t>
+                                <m:t>𝑄𝑢𝑎𝑡</m:t>
                               </m:r>
                               <m:r>
                                 <a:rPr lang="ja-JP" altLang="en-US" sz="1400" i="1">
                                   <a:latin typeface="Cambria Math" panose="02040503050406030204" pitchFamily="18" charset="0"/>
                                 </a:rPr>
-                                <m:t>文字型</m:t>
+                                <m:t>四元数型</m:t>
+                              </m:r>
+                            </m:e>
+                            <m:e>
+                              <m:r>
+                                <a:rPr lang="en-US" altLang="ja-JP" sz="1400" i="1">
+                                  <a:latin typeface="Cambria Math" panose="02040503050406030204" pitchFamily="18" charset="0"/>
+                                </a:rPr>
+                                <m:t>𝐴𝑥𝑖𝑙𝑛</m:t>
+                              </m:r>
+                              <m:r>
+                                <a:rPr lang="ja-JP" altLang="en-US" sz="1400" i="1">
+                                  <a:latin typeface="Cambria Math" panose="02040503050406030204" pitchFamily="18" charset="0"/>
+                                </a:rPr>
+                                <m:t>補助数型</m:t>
                               </m:r>
                               <m:d>
                                 <m:dPr>
@@ -4019,16 +4101,19 @@
                                     </m:eqArrPr>
                                     <m:e>
                                       <m:r>
+                                        <m:rPr>
+                                          <m:sty m:val="p"/>
+                                        </m:rPr>
                                         <a:rPr lang="en-US" altLang="ja-JP" sz="1400" i="1">
                                           <a:latin typeface="Cambria Math" panose="02040503050406030204" pitchFamily="18" charset="0"/>
                                         </a:rPr>
-                                        <m:t>𝐶h𝑎𝑟</m:t>
+                                        <m:t>Vector</m:t>
                                       </m:r>
                                       <m:r>
                                         <a:rPr lang="ja-JP" altLang="en-US" sz="1400" i="1">
                                           <a:latin typeface="Cambria Math" panose="02040503050406030204" pitchFamily="18" charset="0"/>
                                         </a:rPr>
-                                        <m:t>単文字型</m:t>
+                                        <m:t>向量型</m:t>
                                       </m:r>
                                     </m:e>
                                     <m:e>
@@ -4036,567 +4121,28 @@
                                         <a:rPr lang="en-US" altLang="ja-JP" sz="1400" i="1">
                                           <a:latin typeface="Cambria Math" panose="02040503050406030204" pitchFamily="18" charset="0"/>
                                         </a:rPr>
-                                        <m:t>𝑆𝑡𝑟𝑖𝑛𝑔</m:t>
+                                        <m:t>𝑀𝑎𝑡𝑟𝑖𝑥</m:t>
                                       </m:r>
                                       <m:r>
                                         <a:rPr lang="ja-JP" altLang="en-US" sz="1400" i="1">
                                           <a:latin typeface="Cambria Math" panose="02040503050406030204" pitchFamily="18" charset="0"/>
                                         </a:rPr>
-                                        <m:t>文字列型</m:t>
+                                        <m:t>行列型</m:t>
                                       </m:r>
-                                    </m:e>
-                                  </m:eqArr>
-                                </m:e>
-                              </m:d>
-                            </m:e>
-                            <m:e>
-                              <m:r>
-                                <a:rPr lang="en-US" altLang="ja-JP" sz="1400" i="1">
-                                  <a:latin typeface="Cambria Math" panose="02040503050406030204" pitchFamily="18" charset="0"/>
-                                </a:rPr>
-                                <m:t>𝑆𝑦𝑠</m:t>
-                              </m:r>
-                              <m:r>
-                                <a:rPr lang="ja-JP" altLang="en-US" sz="1400" i="1">
-                                  <a:latin typeface="Cambria Math" panose="02040503050406030204" pitchFamily="18" charset="0"/>
-                                </a:rPr>
-                                <m:t>算系型</m:t>
-                              </m:r>
-                              <m:d>
-                                <m:dPr>
-                                  <m:begChr m:val="{"/>
-                                  <m:endChr m:val=""/>
-                                  <m:ctrlPr>
-                                    <a:rPr lang="en-US" altLang="ja-JP" sz="1400" i="1">
-                                      <a:latin typeface="Cambria Math" panose="02040503050406030204" pitchFamily="18" charset="0"/>
-                                    </a:rPr>
-                                  </m:ctrlPr>
-                                </m:dPr>
-                                <m:e>
-                                  <m:eqArr>
-                                    <m:eqArrPr>
-                                      <m:ctrlPr>
-                                        <a:rPr lang="en-US" altLang="ja-JP" sz="1400" i="1">
-                                          <a:latin typeface="Cambria Math" panose="02040503050406030204" pitchFamily="18" charset="0"/>
-                                        </a:rPr>
-                                      </m:ctrlPr>
-                                    </m:eqArrPr>
-                                    <m:e>
-                                      <m:r>
-                                        <a:rPr lang="en-US" altLang="ja-JP" sz="1400" i="1">
-                                          <a:latin typeface="Cambria Math" panose="02040503050406030204" pitchFamily="18" charset="0"/>
-                                        </a:rPr>
-                                        <m:t>𝐵𝑜𝑜𝑙𝑠</m:t>
-                                      </m:r>
-                                      <m:r>
-                                        <a:rPr lang="ja-JP" altLang="en-US" sz="1400" i="1">
-                                          <a:latin typeface="Cambria Math" panose="02040503050406030204" pitchFamily="18" charset="0"/>
-                                        </a:rPr>
-                                        <m:t>論理型</m:t>
-                                      </m:r>
-                                      <m:d>
-                                        <m:dPr>
-                                          <m:begChr m:val="{"/>
-                                          <m:endChr m:val=""/>
-                                          <m:ctrlPr>
-                                            <a:rPr lang="en-US" altLang="ja-JP" sz="1400" i="1">
-                                              <a:latin typeface="Cambria Math" panose="02040503050406030204" pitchFamily="18" charset="0"/>
-                                            </a:rPr>
-                                          </m:ctrlPr>
-                                        </m:dPr>
-                                        <m:e>
-                                          <m:eqArr>
-                                            <m:eqArrPr>
-                                              <m:ctrlPr>
-                                                <a:rPr lang="en-US" altLang="ja-JP" sz="1400" i="1">
-                                                  <a:latin typeface="Cambria Math" panose="02040503050406030204" pitchFamily="18" charset="0"/>
-                                                </a:rPr>
-                                              </m:ctrlPr>
-                                            </m:eqArrPr>
-                                            <m:e>
-                                              <m:r>
-                                                <a:rPr lang="en-US" altLang="ja-JP" sz="1400" i="1">
-                                                  <a:latin typeface="Cambria Math" panose="02040503050406030204" pitchFamily="18" charset="0"/>
-                                                </a:rPr>
-                                                <m:t>𝐵𝑜𝑜𝑙𝑒𝑎𝑛</m:t>
-                                              </m:r>
-                                              <m:r>
-                                                <a:rPr lang="ja-JP" altLang="en-US" sz="1400" i="1">
-                                                  <a:latin typeface="Cambria Math" panose="02040503050406030204" pitchFamily="18" charset="0"/>
-                                                </a:rPr>
-                                                <m:t>二値論理型</m:t>
-                                              </m:r>
-                                            </m:e>
-                                            <m:e>
-                                              <m:r>
-                                                <a:rPr lang="en-US" altLang="ja-JP" sz="1400" i="1">
-                                                  <a:latin typeface="Cambria Math" panose="02040503050406030204" pitchFamily="18" charset="0"/>
-                                                </a:rPr>
-                                                <m:t>𝐾𝑙𝑒𝑏𝑜𝑜𝑙</m:t>
-                                              </m:r>
-                                              <m:r>
-                                                <a:rPr lang="ja-JP" altLang="en-US" sz="1400" i="1">
-                                                  <a:latin typeface="Cambria Math" panose="02040503050406030204" pitchFamily="18" charset="0"/>
-                                                </a:rPr>
-                                                <m:t>三値論理型</m:t>
-                                              </m:r>
-                                            </m:e>
-                                          </m:eqArr>
-                                        </m:e>
-                                      </m:d>
                                     </m:e>
                                     <m:e>
                                       <m:r>
                                         <a:rPr lang="en-US" altLang="ja-JP" sz="1400" i="1">
                                           <a:latin typeface="Cambria Math" panose="02040503050406030204" pitchFamily="18" charset="0"/>
                                         </a:rPr>
-                                        <m:t>𝑁𝑢𝑙𝑙</m:t>
+                                        <m:t>𝐼𝑡𝑣</m:t>
                                       </m:r>
                                       <m:r>
                                         <a:rPr lang="ja-JP" altLang="en-US" sz="1400" i="1">
                                           <a:latin typeface="Cambria Math" panose="02040503050406030204" pitchFamily="18" charset="0"/>
                                         </a:rPr>
-                                        <m:t>非値型</m:t>
+                                        <m:t>区間型</m:t>
                                       </m:r>
-                                      <m:d>
-                                        <m:dPr>
-                                          <m:begChr m:val="{"/>
-                                          <m:endChr m:val=""/>
-                                          <m:ctrlPr>
-                                            <a:rPr lang="en-US" altLang="ja-JP" sz="1400" i="1">
-                                              <a:latin typeface="Cambria Math" panose="02040503050406030204" pitchFamily="18" charset="0"/>
-                                            </a:rPr>
-                                          </m:ctrlPr>
-                                        </m:dPr>
-                                        <m:e>
-                                          <m:eqArr>
-                                            <m:eqArrPr>
-                                              <m:ctrlPr>
-                                                <a:rPr lang="en-US" altLang="ja-JP" sz="1400" i="1">
-                                                  <a:latin typeface="Cambria Math" panose="02040503050406030204" pitchFamily="18" charset="0"/>
-                                                </a:rPr>
-                                              </m:ctrlPr>
-                                            </m:eqArrPr>
-                                            <m:e>
-                                              <m:r>
-                                                <a:rPr lang="en-US" altLang="ja-JP" sz="1400" i="1">
-                                                  <a:latin typeface="Cambria Math" panose="02040503050406030204" pitchFamily="18" charset="0"/>
-                                                </a:rPr>
-                                                <m:t>𝑉𝑜𝑖𝑑</m:t>
-                                              </m:r>
-                                              <m:r>
-                                                <a:rPr lang="ja-JP" altLang="en-US" sz="1400" i="1">
-                                                  <a:latin typeface="Cambria Math" panose="02040503050406030204" pitchFamily="18" charset="0"/>
-                                                </a:rPr>
-                                                <m:t>無値型</m:t>
-                                              </m:r>
-                                            </m:e>
-                                            <m:e>
-                                              <m:r>
-                                                <a:rPr lang="en-US" altLang="ja-JP" sz="1400" i="1">
-                                                  <a:latin typeface="Cambria Math" panose="02040503050406030204" pitchFamily="18" charset="0"/>
-                                                </a:rPr>
-                                                <m:t>𝑈𝑛𝑑𝑒𝑓</m:t>
-                                              </m:r>
-                                              <m:r>
-                                                <a:rPr lang="ja-JP" altLang="en-US" sz="1400" i="1">
-                                                  <a:latin typeface="Cambria Math" panose="02040503050406030204" pitchFamily="18" charset="0"/>
-                                                </a:rPr>
-                                                <m:t>非定義型</m:t>
-                                              </m:r>
-                                            </m:e>
-                                          </m:eqArr>
-                                        </m:e>
-                                      </m:d>
-                                    </m:e>
-                                    <m:e>
-                                      <m:m>
-                                        <m:mPr>
-                                          <m:mcs>
-                                            <m:mc>
-                                              <m:mcPr>
-                                                <m:count m:val="1"/>
-                                                <m:mcJc m:val="center"/>
-                                              </m:mcPr>
-                                            </m:mc>
-                                          </m:mcs>
-                                          <m:ctrlPr>
-                                            <a:rPr lang="en-US" altLang="ja-JP" sz="1400" i="1" smtClean="0">
-                                              <a:latin typeface="Cambria Math" panose="02040503050406030204" pitchFamily="18" charset="0"/>
-                                            </a:rPr>
-                                          </m:ctrlPr>
-                                        </m:mPr>
-                                        <m:mr>
-                                          <m:e>
-                                            <m:r>
-                                              <a:rPr lang="en-US" altLang="ja-JP" sz="1400" i="1" smtClean="0">
-                                                <a:latin typeface="Cambria Math" panose="02040503050406030204" pitchFamily="18" charset="0"/>
-                                              </a:rPr>
-                                              <m:t>𝑂𝑏𝑗𝑒𝑐𝑡</m:t>
-                                            </m:r>
-                                            <m:r>
-                                              <a:rPr lang="ja-JP" altLang="en-US" sz="1400" i="1">
-                                                <a:latin typeface="Cambria Math" panose="02040503050406030204" pitchFamily="18" charset="0"/>
-                                              </a:rPr>
-                                              <m:t>実体型</m:t>
-                                            </m:r>
-                                            <m:d>
-                                              <m:dPr>
-                                                <m:begChr m:val="{"/>
-                                                <m:endChr m:val=""/>
-                                                <m:ctrlPr>
-                                                  <a:rPr lang="en-US" altLang="ja-JP" sz="1400" i="1" smtClean="0">
-                                                    <a:latin typeface="Cambria Math" panose="02040503050406030204" pitchFamily="18" charset="0"/>
-                                                  </a:rPr>
-                                                </m:ctrlPr>
-                                              </m:dPr>
-                                              <m:e>
-                                                <m:eqArr>
-                                                  <m:eqArrPr>
-                                                    <m:ctrlPr>
-                                                      <a:rPr lang="en-US" altLang="ja-JP" sz="1400" i="1" smtClean="0">
-                                                        <a:latin typeface="Cambria Math" panose="02040503050406030204" pitchFamily="18" charset="0"/>
-                                                      </a:rPr>
-                                                    </m:ctrlPr>
-                                                  </m:eqArrPr>
-                                                  <m:e>
-                                                    <m:r>
-                                                      <a:rPr lang="en-US" altLang="ja-JP" sz="1400" i="1">
-                                                        <a:latin typeface="Cambria Math" panose="02040503050406030204" pitchFamily="18" charset="0"/>
-                                                      </a:rPr>
-                                                      <m:t>𝐶𝑜𝑛𝑡</m:t>
-                                                    </m:r>
-                                                    <m:r>
-                                                      <a:rPr lang="ja-JP" altLang="en-US" sz="1400" i="1">
-                                                        <a:latin typeface="Cambria Math" panose="02040503050406030204" pitchFamily="18" charset="0"/>
-                                                      </a:rPr>
-                                                      <m:t>コンテナ型</m:t>
-                                                    </m:r>
-                                                    <m:d>
-                                                      <m:dPr>
-                                                        <m:begChr m:val="{"/>
-                                                        <m:endChr m:val=""/>
-                                                        <m:ctrlPr>
-                                                          <a:rPr lang="en-US" altLang="ja-JP" sz="1400" i="1">
-                                                            <a:latin typeface="Cambria Math" panose="02040503050406030204" pitchFamily="18" charset="0"/>
-                                                          </a:rPr>
-                                                        </m:ctrlPr>
-                                                      </m:dPr>
-                                                      <m:e>
-                                                        <m:eqArr>
-                                                          <m:eqArrPr>
-                                                            <m:ctrlPr>
-                                                              <a:rPr lang="en-US" altLang="ja-JP" sz="1400" i="1">
-                                                                <a:latin typeface="Cambria Math" panose="02040503050406030204" pitchFamily="18" charset="0"/>
-                                                              </a:rPr>
-                                                            </m:ctrlPr>
-                                                          </m:eqArrPr>
-                                                          <m:e>
-                                                            <m:r>
-                                                              <a:rPr lang="en-US" altLang="ja-JP" sz="1400" i="1">
-                                                                <a:latin typeface="Cambria Math" panose="02040503050406030204" pitchFamily="18" charset="0"/>
-                                                              </a:rPr>
-                                                              <m:t>𝑇𝑎𝑏𝑙𝑒</m:t>
-                                                            </m:r>
-                                                            <m:r>
-                                                              <a:rPr lang="ja-JP" altLang="en-US" sz="1400" i="1">
-                                                                <a:latin typeface="Cambria Math" panose="02040503050406030204" pitchFamily="18" charset="0"/>
-                                                              </a:rPr>
-                                                              <m:t>表形式型</m:t>
-                                                            </m:r>
-                                                            <m:d>
-                                                              <m:dPr>
-                                                                <m:begChr m:val="{"/>
-                                                                <m:endChr m:val=""/>
-                                                                <m:ctrlPr>
-                                                                  <a:rPr lang="en-US" altLang="ja-JP" sz="1400" i="1">
-                                                                    <a:latin typeface="Cambria Math" panose="02040503050406030204" pitchFamily="18" charset="0"/>
-                                                                  </a:rPr>
-                                                                </m:ctrlPr>
-                                                              </m:dPr>
-                                                              <m:e>
-                                                                <m:eqArr>
-                                                                  <m:eqArrPr>
-                                                                    <m:ctrlPr>
-                                                                      <a:rPr lang="en-US" altLang="ja-JP" sz="1400" i="1">
-                                                                        <a:latin typeface="Cambria Math" panose="02040503050406030204" pitchFamily="18" charset="0"/>
-                                                                      </a:rPr>
-                                                                    </m:ctrlPr>
-                                                                  </m:eqArrPr>
-                                                                  <m:e>
-                                                                    <m:r>
-                                                                      <a:rPr lang="en-US" altLang="ja-JP" sz="1400" i="1">
-                                                                        <a:latin typeface="Cambria Math" panose="02040503050406030204" pitchFamily="18" charset="0"/>
-                                                                      </a:rPr>
-                                                                      <m:t>𝐿𝑖𝑠𝑡</m:t>
-                                                                    </m:r>
-                                                                    <m:r>
-                                                                      <a:rPr lang="ja-JP" altLang="en-US" sz="1400" i="1">
-                                                                        <a:latin typeface="Cambria Math" panose="02040503050406030204" pitchFamily="18" charset="0"/>
-                                                                      </a:rPr>
-                                                                      <m:t>配列型</m:t>
-                                                                    </m:r>
-                                                                  </m:e>
-                                                                  <m:e>
-                                                                    <m:r>
-                                                                      <a:rPr lang="en-US" altLang="ja-JP" sz="1400" i="1">
-                                                                        <a:latin typeface="Cambria Math" panose="02040503050406030204" pitchFamily="18" charset="0"/>
-                                                                      </a:rPr>
-                                                                      <m:t>𝑀𝑎𝑝</m:t>
-                                                                    </m:r>
-                                                                    <m:r>
-                                                                      <a:rPr lang="ja-JP" altLang="en-US" sz="1400" i="1">
-                                                                        <a:latin typeface="Cambria Math" panose="02040503050406030204" pitchFamily="18" charset="0"/>
-                                                                      </a:rPr>
-                                                                      <m:t>連想表型</m:t>
-                                                                    </m:r>
-                                                                  </m:e>
-                                                                  <m:e>
-                                                                    <m:r>
-                                                                      <a:rPr lang="en-US" altLang="ja-JP" sz="1400" i="1">
-                                                                        <a:latin typeface="Cambria Math" panose="02040503050406030204" pitchFamily="18" charset="0"/>
-                                                                      </a:rPr>
-                                                                      <m:t>𝐵𝑠𝑡</m:t>
-                                                                    </m:r>
-                                                                    <m:r>
-                                                                      <a:rPr lang="ja-JP" altLang="en-US" sz="1400" i="1">
-                                                                        <a:latin typeface="Cambria Math" panose="02040503050406030204" pitchFamily="18" charset="0"/>
-                                                                      </a:rPr>
-                                                                      <m:t>構造表型</m:t>
-                                                                    </m:r>
-                                                                  </m:e>
-                                                                </m:eqArr>
-                                                              </m:e>
-                                                            </m:d>
-                                                          </m:e>
-                                                          <m:e>
-                                                            <m:r>
-                                                              <a:rPr lang="en-US" altLang="ja-JP" sz="1400" i="1">
-                                                                <a:latin typeface="Cambria Math" panose="02040503050406030204" pitchFamily="18" charset="0"/>
-                                                              </a:rPr>
-                                                              <m:t>𝑆𝑡𝑟𝑢𝑐𝑡</m:t>
-                                                            </m:r>
-                                                            <m:r>
-                                                              <a:rPr lang="ja-JP" altLang="en-US" sz="1400" i="1">
-                                                                <a:latin typeface="Cambria Math" panose="02040503050406030204" pitchFamily="18" charset="0"/>
-                                                              </a:rPr>
-                                                              <m:t>構造体型</m:t>
-                                                            </m:r>
-                                                          </m:e>
-                                                        </m:eqArr>
-                                                      </m:e>
-                                                    </m:d>
-                                                  </m:e>
-                                                  <m:e>
-                                                    <m:m>
-                                                      <m:mPr>
-                                                        <m:mcs>
-                                                          <m:mc>
-                                                            <m:mcPr>
-                                                              <m:count m:val="1"/>
-                                                              <m:mcJc m:val="center"/>
-                                                            </m:mcPr>
-                                                          </m:mc>
-                                                        </m:mcs>
-                                                        <m:ctrlPr>
-                                                          <a:rPr lang="en-US" altLang="ja-JP" sz="1400" i="1">
-                                                            <a:latin typeface="Cambria Math" panose="02040503050406030204" pitchFamily="18" charset="0"/>
-                                                          </a:rPr>
-                                                        </m:ctrlPr>
-                                                      </m:mPr>
-                                                      <m:mr>
-                                                        <m:e>
-                                                          <m:r>
-                                                            <m:rPr>
-                                                              <m:brk m:alnAt="7"/>
-                                                            </m:rPr>
-                                                            <a:rPr lang="en-US" altLang="ja-JP" sz="1400" i="1">
-                                                              <a:latin typeface="Cambria Math" panose="02040503050406030204" pitchFamily="18" charset="0"/>
-                                                            </a:rPr>
-                                                            <m:t>𝐵</m:t>
-                                                          </m:r>
-                                                          <m:r>
-                                                            <a:rPr lang="en-US" altLang="ja-JP" sz="1400" i="1">
-                                                              <a:latin typeface="Cambria Math" panose="02040503050406030204" pitchFamily="18" charset="0"/>
-                                                            </a:rPr>
-                                                            <m:t>𝑖𝑛</m:t>
-                                                          </m:r>
-                                                          <m:r>
-                                                            <m:rPr>
-                                                              <m:brk m:alnAt="7"/>
-                                                            </m:rPr>
-                                                            <a:rPr lang="ja-JP" altLang="en-US" sz="1400" i="1">
-                                                              <a:latin typeface="Cambria Math" panose="02040503050406030204" pitchFamily="18" charset="0"/>
-                                                            </a:rPr>
-                                                            <m:t>バ</m:t>
-                                                          </m:r>
-                                                          <m:r>
-                                                            <a:rPr lang="ja-JP" altLang="en-US" sz="1400" i="1">
-                                                              <a:latin typeface="Cambria Math" panose="02040503050406030204" pitchFamily="18" charset="0"/>
-                                                            </a:rPr>
-                                                            <m:t>イナリ型</m:t>
-                                                          </m:r>
-                                                        </m:e>
-                                                      </m:mr>
-                                                      <m:mr>
-                                                        <m:e>
-                                                          <m:r>
-                                                            <a:rPr lang="en-US" altLang="ja-JP" sz="1400" i="1">
-                                                              <a:latin typeface="Cambria Math" panose="02040503050406030204" pitchFamily="18" charset="0"/>
-                                                            </a:rPr>
-                                                            <m:t>𝑆𝑦𝑚𝑏𝑜𝑙</m:t>
-                                                          </m:r>
-                                                          <m:r>
-                                                            <a:rPr lang="ja-JP" altLang="en-US" sz="1400" i="1">
-                                                              <a:latin typeface="Cambria Math" panose="02040503050406030204" pitchFamily="18" charset="0"/>
-                                                            </a:rPr>
-                                                            <m:t>シンボル型</m:t>
-                                                          </m:r>
-                                                        </m:e>
-                                                      </m:mr>
-                                                    </m:m>
-                                                  </m:e>
-                                                  <m:e>
-                                                    <m:m>
-                                                      <m:mPr>
-                                                        <m:mcs>
-                                                          <m:mc>
-                                                            <m:mcPr>
-                                                              <m:count m:val="1"/>
-                                                              <m:mcJc m:val="center"/>
-                                                            </m:mcPr>
-                                                          </m:mc>
-                                                        </m:mcs>
-                                                        <m:ctrlPr>
-                                                          <a:rPr lang="en-US" altLang="ja-JP" sz="1400" i="1">
-                                                            <a:latin typeface="Cambria Math" panose="02040503050406030204" pitchFamily="18" charset="0"/>
-                                                          </a:rPr>
-                                                        </m:ctrlPr>
-                                                      </m:mPr>
-                                                      <m:mr>
-                                                        <m:e>
-                                                          <m:r>
-                                                            <a:rPr lang="en-US" altLang="ja-JP" sz="1400" i="1">
-                                                              <a:latin typeface="Cambria Math" panose="02040503050406030204" pitchFamily="18" charset="0"/>
-                                                            </a:rPr>
-                                                            <m:t>𝐹𝑢𝑛𝑐</m:t>
-                                                          </m:r>
-                                                          <m:r>
-                                                            <a:rPr lang="ja-JP" altLang="en-US" sz="1400" i="1">
-                                                              <a:latin typeface="Cambria Math" panose="02040503050406030204" pitchFamily="18" charset="0"/>
-                                                            </a:rPr>
-                                                            <m:t>関数型</m:t>
-                                                          </m:r>
-                                                        </m:e>
-                                                      </m:mr>
-                                                      <m:mr>
-                                                        <m:e>
-                                                          <m:r>
-                                                            <a:rPr lang="en-US" altLang="ja-JP" sz="1400" i="1">
-                                                              <a:latin typeface="Cambria Math" panose="02040503050406030204" pitchFamily="18" charset="0"/>
-                                                            </a:rPr>
-                                                            <m:t>𝑃𝑡𝑟</m:t>
-                                                          </m:r>
-                                                          <m:r>
-                                                            <a:rPr lang="ja-JP" altLang="en-US" sz="1400" i="1">
-                                                              <a:latin typeface="Cambria Math" panose="02040503050406030204" pitchFamily="18" charset="0"/>
-                                                            </a:rPr>
-                                                            <m:t>ポインタ型</m:t>
-                                                          </m:r>
-                                                        </m:e>
-                                                      </m:mr>
-                                                    </m:m>
-                                                  </m:e>
-                                                </m:eqArr>
-                                              </m:e>
-                                            </m:d>
-                                          </m:e>
-                                        </m:mr>
-                                        <m:mr>
-                                          <m:e>
-                                            <m:d>
-                                              <m:dPr>
-                                                <m:begChr m:val="{"/>
-                                                <m:endChr m:val=""/>
-                                                <m:ctrlPr>
-                                                  <a:rPr lang="en-US" altLang="ja-JP" sz="1400" i="1" smtClean="0">
-                                                    <a:latin typeface="Cambria Math" panose="02040503050406030204" pitchFamily="18" charset="0"/>
-                                                  </a:rPr>
-                                                </m:ctrlPr>
-                                              </m:dPr>
-                                              <m:e>
-                                                <m:eqArr>
-                                                  <m:eqArrPr>
-                                                    <m:ctrlPr>
-                                                      <a:rPr lang="en-US" altLang="ja-JP" sz="1400" i="1">
-                                                        <a:latin typeface="Cambria Math" panose="02040503050406030204" pitchFamily="18" charset="0"/>
-                                                      </a:rPr>
-                                                    </m:ctrlPr>
-                                                  </m:eqArrPr>
-                                                  <m:e>
-                                                    <m:r>
-                                                      <a:rPr lang="en-US" altLang="ja-JP" sz="1400" b="0" i="1" smtClean="0">
-                                                        <a:latin typeface="Cambria Math" panose="02040503050406030204" pitchFamily="18" charset="0"/>
-                                                      </a:rPr>
-                                                      <m:t>(</m:t>
-                                                    </m:r>
-                                                    <m:r>
-                                                      <a:rPr lang="en-US" altLang="ja-JP" sz="1400" b="0" i="1" smtClean="0">
-                                                        <a:latin typeface="Cambria Math" panose="02040503050406030204" pitchFamily="18" charset="0"/>
-                                                      </a:rPr>
-                                                      <m:t>𝑡𝑎</m:t>
-                                                    </m:r>
-                                                    <m:r>
-                                                      <a:rPr lang="en-US" altLang="ja-JP" sz="1400" b="0" i="1" smtClean="0">
-                                                        <a:latin typeface="Cambria Math" panose="02040503050406030204" pitchFamily="18" charset="0"/>
-                                                      </a:rPr>
-                                                      <m:t>,</m:t>
-                                                    </m:r>
-                                                    <m:r>
-                                                      <a:rPr lang="en-US" altLang="ja-JP" sz="1400" b="0" i="1" smtClean="0">
-                                                        <a:latin typeface="Cambria Math" panose="02040503050406030204" pitchFamily="18" charset="0"/>
-                                                      </a:rPr>
-                                                      <m:t>𝑡𝑏</m:t>
-                                                    </m:r>
-                                                    <m:r>
-                                                      <a:rPr lang="en-US" altLang="ja-JP" sz="1400" b="0" i="1" smtClean="0">
-                                                        <a:latin typeface="Cambria Math" panose="02040503050406030204" pitchFamily="18" charset="0"/>
-                                                      </a:rPr>
-                                                      <m:t>,</m:t>
-                                                    </m:r>
-                                                    <m:r>
-                                                      <a:rPr lang="en-US" altLang="ja-JP" sz="1400" b="0" i="1" smtClean="0">
-                                                        <a:latin typeface="Cambria Math" panose="02040503050406030204" pitchFamily="18" charset="0"/>
-                                                      </a:rPr>
-                                                      <m:t>𝑡𝑐</m:t>
-                                                    </m:r>
-                                                    <m:r>
-                                                      <a:rPr lang="en-US" altLang="ja-JP" sz="1400" b="0" i="1" smtClean="0">
-                                                        <a:latin typeface="Cambria Math" panose="02040503050406030204" pitchFamily="18" charset="0"/>
-                                                      </a:rPr>
-                                                      <m:t>)</m:t>
-                                                    </m:r>
-                                                    <m:r>
-                                                      <a:rPr lang="ja-JP" altLang="en-US" sz="1400" i="1">
-                                                        <a:latin typeface="Cambria Math" panose="02040503050406030204" pitchFamily="18" charset="0"/>
-                                                      </a:rPr>
-                                                      <m:t>列挙型</m:t>
-                                                    </m:r>
-                                                  </m:e>
-                                                  <m:e>
-                                                    <m:r>
-                                                      <a:rPr lang="ja-JP" altLang="en-US" sz="1400" i="1">
-                                                        <a:latin typeface="Cambria Math" panose="02040503050406030204" pitchFamily="18" charset="0"/>
-                                                      </a:rPr>
-                                                      <m:t>匿名型</m:t>
-                                                    </m:r>
-                                                  </m:e>
-                                                </m:eqArr>
-                                              </m:e>
-                                            </m:d>
-                                          </m:e>
-                                        </m:mr>
-                                      </m:m>
                                     </m:e>
                                   </m:eqArr>
                                 </m:e>
@@ -4630,8 +4176,8 @@
             </p:nvSpPr>
             <p:spPr>
               <a:xfrm>
-                <a:off x="162560" y="218878"/>
-                <a:ext cx="8900159" cy="6415795"/>
+                <a:off x="1686561" y="218879"/>
+                <a:ext cx="7825880" cy="2264915"/>
               </a:xfrm>
               <a:prstGeom prst="rect">
                 <a:avLst/>
@@ -4661,7 +4207,860 @@
     </p:spTree>
     <p:extLst>
       <p:ext uri="{BB962C8B-B14F-4D97-AF65-F5344CB8AC3E}">
-        <p14:creationId xmlns:p14="http://schemas.microsoft.com/office/powerpoint/2010/main" val="1265455521"/>
+        <p14:creationId xmlns:p14="http://schemas.microsoft.com/office/powerpoint/2010/main" val="1810964206"/>
+      </p:ext>
+    </p:extLst>
+  </p:cSld>
+  <p:clrMapOvr>
+    <a:masterClrMapping/>
+  </p:clrMapOvr>
+</p:sld>
+</file>
+
+<file path=ppt/slides/slide3.xml><?xml version="1.0" encoding="utf-8"?>
+<p:sld xmlns:a="http://schemas.openxmlformats.org/drawingml/2006/main" xmlns:r="http://schemas.openxmlformats.org/officeDocument/2006/relationships" xmlns:p="http://schemas.openxmlformats.org/presentationml/2006/main">
+  <p:cSld>
+    <p:spTree>
+      <p:nvGrpSpPr>
+        <p:cNvPr id="1" name=""/>
+        <p:cNvGrpSpPr/>
+        <p:nvPr/>
+      </p:nvGrpSpPr>
+      <p:grpSpPr>
+        <a:xfrm>
+          <a:off x="0" y="0"/>
+          <a:ext cx="0" cy="0"/>
+          <a:chOff x="0" y="0"/>
+          <a:chExt cx="0" cy="0"/>
+        </a:xfrm>
+      </p:grpSpPr>
+      <mc:AlternateContent xmlns:mc="http://schemas.openxmlformats.org/markup-compatibility/2006">
+        <mc:Choice xmlns:a14="http://schemas.microsoft.com/office/drawing/2010/main" Requires="a14">
+          <p:sp>
+            <p:nvSpPr>
+              <p:cNvPr id="2" name="テキスト ボックス 1">
+                <a:extLst>
+                  <a:ext uri="{FF2B5EF4-FFF2-40B4-BE49-F238E27FC236}">
+                    <a16:creationId xmlns:a16="http://schemas.microsoft.com/office/drawing/2014/main" id="{F11CC1F2-89DF-4D48-8996-97FF02999196}"/>
+                  </a:ext>
+                </a:extLst>
+              </p:cNvPr>
+              <p:cNvSpPr txBox="1"/>
+              <p:nvPr/>
+            </p:nvSpPr>
+            <p:spPr>
+              <a:xfrm>
+                <a:off x="1686561" y="218879"/>
+                <a:ext cx="8900159" cy="480581"/>
+              </a:xfrm>
+              <a:prstGeom prst="rect">
+                <a:avLst/>
+              </a:prstGeom>
+              <a:noFill/>
+            </p:spPr>
+            <p:txBody>
+              <a:bodyPr wrap="square" lIns="0" tIns="0" rIns="0" bIns="0" rtlCol="0">
+                <a:spAutoFit/>
+              </a:bodyPr>
+              <a:lstStyle/>
+              <a:p>
+                <a:pPr/>
+                <a14:m>
+                  <m:oMathPara xmlns:m="http://schemas.openxmlformats.org/officeDocument/2006/math">
+                    <m:oMathParaPr>
+                      <m:jc m:val="left"/>
+                    </m:oMathParaPr>
+                    <m:oMath xmlns:m="http://schemas.openxmlformats.org/officeDocument/2006/math">
+                      <m:r>
+                        <a:rPr lang="en-US" altLang="ja-JP" sz="1400" i="1">
+                          <a:latin typeface="Cambria Math" panose="02040503050406030204" pitchFamily="18" charset="0"/>
+                        </a:rPr>
+                        <m:t>𝐶𝑐𝑜𝑑𝑒</m:t>
+                      </m:r>
+                      <m:r>
+                        <a:rPr lang="ja-JP" altLang="en-US" sz="1400" i="1">
+                          <a:latin typeface="Cambria Math" panose="02040503050406030204" pitchFamily="18" charset="0"/>
+                        </a:rPr>
+                        <m:t>文字型</m:t>
+                      </m:r>
+                      <m:d>
+                        <m:dPr>
+                          <m:begChr m:val="{"/>
+                          <m:endChr m:val=""/>
+                          <m:ctrlPr>
+                            <a:rPr lang="en-US" altLang="ja-JP" sz="1400" i="1">
+                              <a:latin typeface="Cambria Math" panose="02040503050406030204" pitchFamily="18" charset="0"/>
+                            </a:rPr>
+                          </m:ctrlPr>
+                        </m:dPr>
+                        <m:e>
+                          <m:eqArr>
+                            <m:eqArrPr>
+                              <m:ctrlPr>
+                                <a:rPr lang="en-US" altLang="ja-JP" sz="1400" i="1">
+                                  <a:latin typeface="Cambria Math" panose="02040503050406030204" pitchFamily="18" charset="0"/>
+                                </a:rPr>
+                              </m:ctrlPr>
+                            </m:eqArrPr>
+                            <m:e>
+                              <m:r>
+                                <a:rPr lang="en-US" altLang="ja-JP" sz="1400" i="1">
+                                  <a:latin typeface="Cambria Math" panose="02040503050406030204" pitchFamily="18" charset="0"/>
+                                </a:rPr>
+                                <m:t>𝐶h𝑎𝑟</m:t>
+                              </m:r>
+                              <m:r>
+                                <a:rPr lang="ja-JP" altLang="en-US" sz="1400" i="1">
+                                  <a:latin typeface="Cambria Math" panose="02040503050406030204" pitchFamily="18" charset="0"/>
+                                </a:rPr>
+                                <m:t>単文字型</m:t>
+                              </m:r>
+                            </m:e>
+                            <m:e>
+                              <m:r>
+                                <a:rPr lang="en-US" altLang="ja-JP" sz="1400" i="1">
+                                  <a:latin typeface="Cambria Math" panose="02040503050406030204" pitchFamily="18" charset="0"/>
+                                </a:rPr>
+                                <m:t>𝑆𝑡𝑟𝑖𝑛𝑔</m:t>
+                              </m:r>
+                              <m:r>
+                                <a:rPr lang="ja-JP" altLang="en-US" sz="1400" i="1">
+                                  <a:latin typeface="Cambria Math" panose="02040503050406030204" pitchFamily="18" charset="0"/>
+                                </a:rPr>
+                                <m:t>文字列型</m:t>
+                              </m:r>
+                            </m:e>
+                          </m:eqArr>
+                        </m:e>
+                      </m:d>
+                    </m:oMath>
+                  </m:oMathPara>
+                </a14:m>
+                <a:endParaRPr lang="ja-JP" altLang="en-US" sz="1400" dirty="0"/>
+              </a:p>
+            </p:txBody>
+          </p:sp>
+        </mc:Choice>
+        <mc:Fallback>
+          <p:sp>
+            <p:nvSpPr>
+              <p:cNvPr id="2" name="テキスト ボックス 1">
+                <a:extLst>
+                  <a:ext uri="{FF2B5EF4-FFF2-40B4-BE49-F238E27FC236}">
+                    <a16:creationId xmlns:a16="http://schemas.microsoft.com/office/drawing/2014/main" id="{F11CC1F2-89DF-4D48-8996-97FF02999196}"/>
+                  </a:ext>
+                </a:extLst>
+              </p:cNvPr>
+              <p:cNvSpPr txBox="1">
+                <a:spLocks noRot="1" noChangeAspect="1" noMove="1" noResize="1" noEditPoints="1" noAdjustHandles="1" noChangeArrowheads="1" noChangeShapeType="1" noTextEdit="1"/>
+              </p:cNvSpPr>
+              <p:nvPr/>
+            </p:nvSpPr>
+            <p:spPr>
+              <a:xfrm>
+                <a:off x="1686561" y="218879"/>
+                <a:ext cx="8900159" cy="480581"/>
+              </a:xfrm>
+              <a:prstGeom prst="rect">
+                <a:avLst/>
+              </a:prstGeom>
+              <a:blipFill>
+                <a:blip r:embed="rId2"/>
+                <a:stretch>
+                  <a:fillRect l="-753" t="-224051" b="-324051"/>
+                </a:stretch>
+              </a:blipFill>
+            </p:spPr>
+            <p:txBody>
+              <a:bodyPr/>
+              <a:lstStyle/>
+              <a:p>
+                <a:r>
+                  <a:rPr lang="ja-JP" altLang="en-US">
+                    <a:noFill/>
+                  </a:rPr>
+                  <a:t> </a:t>
+                </a:r>
+              </a:p>
+            </p:txBody>
+          </p:sp>
+        </mc:Fallback>
+      </mc:AlternateContent>
+    </p:spTree>
+    <p:extLst>
+      <p:ext uri="{BB962C8B-B14F-4D97-AF65-F5344CB8AC3E}">
+        <p14:creationId xmlns:p14="http://schemas.microsoft.com/office/powerpoint/2010/main" val="594786704"/>
+      </p:ext>
+    </p:extLst>
+  </p:cSld>
+  <p:clrMapOvr>
+    <a:masterClrMapping/>
+  </p:clrMapOvr>
+</p:sld>
+</file>
+
+<file path=ppt/slides/slide4.xml><?xml version="1.0" encoding="utf-8"?>
+<p:sld xmlns:a="http://schemas.openxmlformats.org/drawingml/2006/main" xmlns:r="http://schemas.openxmlformats.org/officeDocument/2006/relationships" xmlns:p="http://schemas.openxmlformats.org/presentationml/2006/main">
+  <p:cSld>
+    <p:spTree>
+      <p:nvGrpSpPr>
+        <p:cNvPr id="1" name=""/>
+        <p:cNvGrpSpPr/>
+        <p:nvPr/>
+      </p:nvGrpSpPr>
+      <p:grpSpPr>
+        <a:xfrm>
+          <a:off x="0" y="0"/>
+          <a:ext cx="0" cy="0"/>
+          <a:chOff x="0" y="0"/>
+          <a:chExt cx="0" cy="0"/>
+        </a:xfrm>
+      </p:grpSpPr>
+      <mc:AlternateContent xmlns:mc="http://schemas.openxmlformats.org/markup-compatibility/2006">
+        <mc:Choice xmlns:a14="http://schemas.microsoft.com/office/drawing/2010/main" Requires="a14">
+          <p:sp>
+            <p:nvSpPr>
+              <p:cNvPr id="2" name="テキスト ボックス 1">
+                <a:extLst>
+                  <a:ext uri="{FF2B5EF4-FFF2-40B4-BE49-F238E27FC236}">
+                    <a16:creationId xmlns:a16="http://schemas.microsoft.com/office/drawing/2014/main" id="{F11CC1F2-89DF-4D48-8996-97FF02999196}"/>
+                  </a:ext>
+                </a:extLst>
+              </p:cNvPr>
+              <p:cNvSpPr txBox="1"/>
+              <p:nvPr/>
+            </p:nvSpPr>
+            <p:spPr>
+              <a:xfrm>
+                <a:off x="1686561" y="218879"/>
+                <a:ext cx="8900159" cy="3563861"/>
+              </a:xfrm>
+              <a:prstGeom prst="rect">
+                <a:avLst/>
+              </a:prstGeom>
+              <a:noFill/>
+            </p:spPr>
+            <p:txBody>
+              <a:bodyPr wrap="square" lIns="0" tIns="0" rIns="0" bIns="0" rtlCol="0">
+                <a:spAutoFit/>
+              </a:bodyPr>
+              <a:lstStyle/>
+              <a:p>
+                <a:pPr/>
+                <a14:m>
+                  <m:oMathPara xmlns:m="http://schemas.openxmlformats.org/officeDocument/2006/math">
+                    <m:oMathParaPr>
+                      <m:jc m:val="left"/>
+                    </m:oMathParaPr>
+                    <m:oMath xmlns:m="http://schemas.openxmlformats.org/officeDocument/2006/math">
+                      <m:r>
+                        <a:rPr lang="en-US" altLang="ja-JP" sz="1400" i="1">
+                          <a:latin typeface="Cambria Math" panose="02040503050406030204" pitchFamily="18" charset="0"/>
+                        </a:rPr>
+                        <m:t>𝑆𝑦𝑠</m:t>
+                      </m:r>
+                      <m:r>
+                        <a:rPr lang="ja-JP" altLang="en-US" sz="1400" i="1">
+                          <a:latin typeface="Cambria Math" panose="02040503050406030204" pitchFamily="18" charset="0"/>
+                        </a:rPr>
+                        <m:t>算系型</m:t>
+                      </m:r>
+                      <m:d>
+                        <m:dPr>
+                          <m:begChr m:val="{"/>
+                          <m:endChr m:val=""/>
+                          <m:ctrlPr>
+                            <a:rPr lang="en-US" altLang="ja-JP" sz="1400" i="1">
+                              <a:latin typeface="Cambria Math" panose="02040503050406030204" pitchFamily="18" charset="0"/>
+                            </a:rPr>
+                          </m:ctrlPr>
+                        </m:dPr>
+                        <m:e>
+                          <m:eqArr>
+                            <m:eqArrPr>
+                              <m:ctrlPr>
+                                <a:rPr lang="en-US" altLang="ja-JP" sz="1400" i="1">
+                                  <a:latin typeface="Cambria Math" panose="02040503050406030204" pitchFamily="18" charset="0"/>
+                                </a:rPr>
+                              </m:ctrlPr>
+                            </m:eqArrPr>
+                            <m:e>
+                              <m:r>
+                                <a:rPr lang="en-US" altLang="ja-JP" sz="1400" i="1">
+                                  <a:latin typeface="Cambria Math" panose="02040503050406030204" pitchFamily="18" charset="0"/>
+                                </a:rPr>
+                                <m:t>𝐵𝑜𝑜𝑙𝑠</m:t>
+                              </m:r>
+                              <m:r>
+                                <a:rPr lang="ja-JP" altLang="en-US" sz="1400" i="1">
+                                  <a:latin typeface="Cambria Math" panose="02040503050406030204" pitchFamily="18" charset="0"/>
+                                </a:rPr>
+                                <m:t>論理型</m:t>
+                              </m:r>
+                              <m:d>
+                                <m:dPr>
+                                  <m:begChr m:val="{"/>
+                                  <m:endChr m:val=""/>
+                                  <m:ctrlPr>
+                                    <a:rPr lang="en-US" altLang="ja-JP" sz="1400" i="1">
+                                      <a:latin typeface="Cambria Math" panose="02040503050406030204" pitchFamily="18" charset="0"/>
+                                    </a:rPr>
+                                  </m:ctrlPr>
+                                </m:dPr>
+                                <m:e>
+                                  <m:eqArr>
+                                    <m:eqArrPr>
+                                      <m:ctrlPr>
+                                        <a:rPr lang="en-US" altLang="ja-JP" sz="1400" i="1">
+                                          <a:latin typeface="Cambria Math" panose="02040503050406030204" pitchFamily="18" charset="0"/>
+                                        </a:rPr>
+                                      </m:ctrlPr>
+                                    </m:eqArrPr>
+                                    <m:e>
+                                      <m:r>
+                                        <a:rPr lang="en-US" altLang="ja-JP" sz="1400" i="1">
+                                          <a:latin typeface="Cambria Math" panose="02040503050406030204" pitchFamily="18" charset="0"/>
+                                        </a:rPr>
+                                        <m:t>𝐵𝑜𝑜𝑙𝑒𝑎𝑛</m:t>
+                                      </m:r>
+                                      <m:r>
+                                        <a:rPr lang="ja-JP" altLang="en-US" sz="1400" i="1">
+                                          <a:latin typeface="Cambria Math" panose="02040503050406030204" pitchFamily="18" charset="0"/>
+                                        </a:rPr>
+                                        <m:t>二値論理型</m:t>
+                                      </m:r>
+                                    </m:e>
+                                    <m:e>
+                                      <m:r>
+                                        <a:rPr lang="en-US" altLang="ja-JP" sz="1400" i="1">
+                                          <a:latin typeface="Cambria Math" panose="02040503050406030204" pitchFamily="18" charset="0"/>
+                                        </a:rPr>
+                                        <m:t>𝐾𝑙𝑒𝑏𝑜𝑜𝑙</m:t>
+                                      </m:r>
+                                      <m:r>
+                                        <a:rPr lang="ja-JP" altLang="en-US" sz="1400" i="1">
+                                          <a:latin typeface="Cambria Math" panose="02040503050406030204" pitchFamily="18" charset="0"/>
+                                        </a:rPr>
+                                        <m:t>三値論理型</m:t>
+                                      </m:r>
+                                    </m:e>
+                                  </m:eqArr>
+                                </m:e>
+                              </m:d>
+                            </m:e>
+                            <m:e>
+                              <m:r>
+                                <a:rPr lang="en-US" altLang="ja-JP" sz="1400" i="1">
+                                  <a:latin typeface="Cambria Math" panose="02040503050406030204" pitchFamily="18" charset="0"/>
+                                </a:rPr>
+                                <m:t>𝑁𝑢𝑙𝑙</m:t>
+                              </m:r>
+                              <m:r>
+                                <a:rPr lang="ja-JP" altLang="en-US" sz="1400" i="1">
+                                  <a:latin typeface="Cambria Math" panose="02040503050406030204" pitchFamily="18" charset="0"/>
+                                </a:rPr>
+                                <m:t>非値型</m:t>
+                              </m:r>
+                              <m:d>
+                                <m:dPr>
+                                  <m:begChr m:val="{"/>
+                                  <m:endChr m:val=""/>
+                                  <m:ctrlPr>
+                                    <a:rPr lang="en-US" altLang="ja-JP" sz="1400" i="1">
+                                      <a:latin typeface="Cambria Math" panose="02040503050406030204" pitchFamily="18" charset="0"/>
+                                    </a:rPr>
+                                  </m:ctrlPr>
+                                </m:dPr>
+                                <m:e>
+                                  <m:eqArr>
+                                    <m:eqArrPr>
+                                      <m:ctrlPr>
+                                        <a:rPr lang="en-US" altLang="ja-JP" sz="1400" i="1">
+                                          <a:latin typeface="Cambria Math" panose="02040503050406030204" pitchFamily="18" charset="0"/>
+                                        </a:rPr>
+                                      </m:ctrlPr>
+                                    </m:eqArrPr>
+                                    <m:e>
+                                      <m:r>
+                                        <a:rPr lang="en-US" altLang="ja-JP" sz="1400" i="1">
+                                          <a:latin typeface="Cambria Math" panose="02040503050406030204" pitchFamily="18" charset="0"/>
+                                        </a:rPr>
+                                        <m:t>𝑉𝑜𝑖𝑑</m:t>
+                                      </m:r>
+                                      <m:r>
+                                        <a:rPr lang="ja-JP" altLang="en-US" sz="1400" i="1">
+                                          <a:latin typeface="Cambria Math" panose="02040503050406030204" pitchFamily="18" charset="0"/>
+                                        </a:rPr>
+                                        <m:t>無値型</m:t>
+                                      </m:r>
+                                    </m:e>
+                                    <m:e>
+                                      <m:r>
+                                        <a:rPr lang="en-US" altLang="ja-JP" sz="1400" i="1">
+                                          <a:latin typeface="Cambria Math" panose="02040503050406030204" pitchFamily="18" charset="0"/>
+                                        </a:rPr>
+                                        <m:t>𝑈𝑛𝑑𝑒𝑓</m:t>
+                                      </m:r>
+                                      <m:r>
+                                        <a:rPr lang="ja-JP" altLang="en-US" sz="1400" i="1">
+                                          <a:latin typeface="Cambria Math" panose="02040503050406030204" pitchFamily="18" charset="0"/>
+                                        </a:rPr>
+                                        <m:t>非定義型</m:t>
+                                      </m:r>
+                                    </m:e>
+                                  </m:eqArr>
+                                </m:e>
+                              </m:d>
+                            </m:e>
+                            <m:e>
+                              <m:m>
+                                <m:mPr>
+                                  <m:mcs>
+                                    <m:mc>
+                                      <m:mcPr>
+                                        <m:count m:val="1"/>
+                                        <m:mcJc m:val="center"/>
+                                      </m:mcPr>
+                                    </m:mc>
+                                  </m:mcs>
+                                  <m:ctrlPr>
+                                    <a:rPr lang="en-US" altLang="ja-JP" sz="1400" i="1">
+                                      <a:latin typeface="Cambria Math" panose="02040503050406030204" pitchFamily="18" charset="0"/>
+                                    </a:rPr>
+                                  </m:ctrlPr>
+                                </m:mPr>
+                                <m:mr>
+                                  <m:e>
+                                    <m:r>
+                                      <a:rPr lang="en-US" altLang="ja-JP" sz="1400" i="1">
+                                        <a:latin typeface="Cambria Math" panose="02040503050406030204" pitchFamily="18" charset="0"/>
+                                      </a:rPr>
+                                      <m:t>𝑂𝑏𝑗𝑒𝑐𝑡</m:t>
+                                    </m:r>
+                                    <m:r>
+                                      <a:rPr lang="ja-JP" altLang="en-US" sz="1400" i="1">
+                                        <a:latin typeface="Cambria Math" panose="02040503050406030204" pitchFamily="18" charset="0"/>
+                                      </a:rPr>
+                                      <m:t>実体型</m:t>
+                                    </m:r>
+                                    <m:d>
+                                      <m:dPr>
+                                        <m:begChr m:val="{"/>
+                                        <m:endChr m:val=""/>
+                                        <m:ctrlPr>
+                                          <a:rPr lang="en-US" altLang="ja-JP" sz="1400" i="1">
+                                            <a:latin typeface="Cambria Math" panose="02040503050406030204" pitchFamily="18" charset="0"/>
+                                          </a:rPr>
+                                        </m:ctrlPr>
+                                      </m:dPr>
+                                      <m:e>
+                                        <m:eqArr>
+                                          <m:eqArrPr>
+                                            <m:ctrlPr>
+                                              <a:rPr lang="en-US" altLang="ja-JP" sz="1400" i="1">
+                                                <a:latin typeface="Cambria Math" panose="02040503050406030204" pitchFamily="18" charset="0"/>
+                                              </a:rPr>
+                                            </m:ctrlPr>
+                                          </m:eqArrPr>
+                                          <m:e>
+                                            <m:r>
+                                              <a:rPr lang="en-US" altLang="ja-JP" sz="1400" i="1">
+                                                <a:latin typeface="Cambria Math" panose="02040503050406030204" pitchFamily="18" charset="0"/>
+                                              </a:rPr>
+                                              <m:t>𝐶𝑜𝑛𝑡</m:t>
+                                            </m:r>
+                                            <m:r>
+                                              <a:rPr lang="ja-JP" altLang="en-US" sz="1400" i="1">
+                                                <a:latin typeface="Cambria Math" panose="02040503050406030204" pitchFamily="18" charset="0"/>
+                                              </a:rPr>
+                                              <m:t>コンテナ型</m:t>
+                                            </m:r>
+                                            <m:d>
+                                              <m:dPr>
+                                                <m:begChr m:val="{"/>
+                                                <m:endChr m:val=""/>
+                                                <m:ctrlPr>
+                                                  <a:rPr lang="en-US" altLang="ja-JP" sz="1400" i="1">
+                                                    <a:latin typeface="Cambria Math" panose="02040503050406030204" pitchFamily="18" charset="0"/>
+                                                  </a:rPr>
+                                                </m:ctrlPr>
+                                              </m:dPr>
+                                              <m:e>
+                                                <m:eqArr>
+                                                  <m:eqArrPr>
+                                                    <m:ctrlPr>
+                                                      <a:rPr lang="en-US" altLang="ja-JP" sz="1400" i="1">
+                                                        <a:latin typeface="Cambria Math" panose="02040503050406030204" pitchFamily="18" charset="0"/>
+                                                      </a:rPr>
+                                                    </m:ctrlPr>
+                                                  </m:eqArrPr>
+                                                  <m:e>
+                                                    <m:r>
+                                                      <a:rPr lang="en-US" altLang="ja-JP" sz="1400" i="1">
+                                                        <a:latin typeface="Cambria Math" panose="02040503050406030204" pitchFamily="18" charset="0"/>
+                                                      </a:rPr>
+                                                      <m:t>𝑇𝑎𝑏𝑙𝑒</m:t>
+                                                    </m:r>
+                                                    <m:r>
+                                                      <a:rPr lang="ja-JP" altLang="en-US" sz="1400" i="1">
+                                                        <a:latin typeface="Cambria Math" panose="02040503050406030204" pitchFamily="18" charset="0"/>
+                                                      </a:rPr>
+                                                      <m:t>表形式型</m:t>
+                                                    </m:r>
+                                                    <m:d>
+                                                      <m:dPr>
+                                                        <m:begChr m:val="{"/>
+                                                        <m:endChr m:val=""/>
+                                                        <m:ctrlPr>
+                                                          <a:rPr lang="en-US" altLang="ja-JP" sz="1400" i="1">
+                                                            <a:latin typeface="Cambria Math" panose="02040503050406030204" pitchFamily="18" charset="0"/>
+                                                          </a:rPr>
+                                                        </m:ctrlPr>
+                                                      </m:dPr>
+                                                      <m:e>
+                                                        <m:eqArr>
+                                                          <m:eqArrPr>
+                                                            <m:ctrlPr>
+                                                              <a:rPr lang="en-US" altLang="ja-JP" sz="1400" i="1">
+                                                                <a:latin typeface="Cambria Math" panose="02040503050406030204" pitchFamily="18" charset="0"/>
+                                                              </a:rPr>
+                                                            </m:ctrlPr>
+                                                          </m:eqArrPr>
+                                                          <m:e>
+                                                            <m:r>
+                                                              <a:rPr lang="en-US" altLang="ja-JP" sz="1400" i="1">
+                                                                <a:latin typeface="Cambria Math" panose="02040503050406030204" pitchFamily="18" charset="0"/>
+                                                              </a:rPr>
+                                                              <m:t>𝐿𝑖𝑠𝑡</m:t>
+                                                            </m:r>
+                                                            <m:r>
+                                                              <a:rPr lang="ja-JP" altLang="en-US" sz="1400" i="1">
+                                                                <a:latin typeface="Cambria Math" panose="02040503050406030204" pitchFamily="18" charset="0"/>
+                                                              </a:rPr>
+                                                              <m:t>配列型</m:t>
+                                                            </m:r>
+                                                          </m:e>
+                                                          <m:e>
+                                                            <m:r>
+                                                              <a:rPr lang="en-US" altLang="ja-JP" sz="1400" i="1">
+                                                                <a:latin typeface="Cambria Math" panose="02040503050406030204" pitchFamily="18" charset="0"/>
+                                                              </a:rPr>
+                                                              <m:t>𝑀𝑎𝑝</m:t>
+                                                            </m:r>
+                                                            <m:r>
+                                                              <a:rPr lang="ja-JP" altLang="en-US" sz="1400" i="1">
+                                                                <a:latin typeface="Cambria Math" panose="02040503050406030204" pitchFamily="18" charset="0"/>
+                                                              </a:rPr>
+                                                              <m:t>連想表型</m:t>
+                                                            </m:r>
+                                                          </m:e>
+                                                          <m:e>
+                                                            <m:r>
+                                                              <a:rPr lang="en-US" altLang="ja-JP" sz="1400" i="1">
+                                                                <a:latin typeface="Cambria Math" panose="02040503050406030204" pitchFamily="18" charset="0"/>
+                                                              </a:rPr>
+                                                              <m:t>𝐵𝑠𝑡</m:t>
+                                                            </m:r>
+                                                            <m:r>
+                                                              <a:rPr lang="ja-JP" altLang="en-US" sz="1400" i="1">
+                                                                <a:latin typeface="Cambria Math" panose="02040503050406030204" pitchFamily="18" charset="0"/>
+                                                              </a:rPr>
+                                                              <m:t>構造表型</m:t>
+                                                            </m:r>
+                                                          </m:e>
+                                                        </m:eqArr>
+                                                      </m:e>
+                                                    </m:d>
+                                                  </m:e>
+                                                  <m:e>
+                                                    <m:r>
+                                                      <a:rPr lang="en-US" altLang="ja-JP" sz="1400" i="1">
+                                                        <a:latin typeface="Cambria Math" panose="02040503050406030204" pitchFamily="18" charset="0"/>
+                                                      </a:rPr>
+                                                      <m:t>𝑆𝑡𝑟𝑢𝑐𝑡</m:t>
+                                                    </m:r>
+                                                    <m:r>
+                                                      <a:rPr lang="ja-JP" altLang="en-US" sz="1400" i="1">
+                                                        <a:latin typeface="Cambria Math" panose="02040503050406030204" pitchFamily="18" charset="0"/>
+                                                      </a:rPr>
+                                                      <m:t>構造体型</m:t>
+                                                    </m:r>
+                                                  </m:e>
+                                                </m:eqArr>
+                                              </m:e>
+                                            </m:d>
+                                          </m:e>
+                                          <m:e>
+                                            <m:m>
+                                              <m:mPr>
+                                                <m:mcs>
+                                                  <m:mc>
+                                                    <m:mcPr>
+                                                      <m:count m:val="1"/>
+                                                      <m:mcJc m:val="center"/>
+                                                    </m:mcPr>
+                                                  </m:mc>
+                                                </m:mcs>
+                                                <m:ctrlPr>
+                                                  <a:rPr lang="en-US" altLang="ja-JP" sz="1400" i="1">
+                                                    <a:latin typeface="Cambria Math" panose="02040503050406030204" pitchFamily="18" charset="0"/>
+                                                  </a:rPr>
+                                                </m:ctrlPr>
+                                              </m:mPr>
+                                              <m:mr>
+                                                <m:e>
+                                                  <m:r>
+                                                    <m:rPr>
+                                                      <m:brk m:alnAt="7"/>
+                                                    </m:rPr>
+                                                    <a:rPr lang="en-US" altLang="ja-JP" sz="1400" i="1">
+                                                      <a:latin typeface="Cambria Math" panose="02040503050406030204" pitchFamily="18" charset="0"/>
+                                                    </a:rPr>
+                                                    <m:t>𝐵</m:t>
+                                                  </m:r>
+                                                  <m:r>
+                                                    <a:rPr lang="en-US" altLang="ja-JP" sz="1400" i="1">
+                                                      <a:latin typeface="Cambria Math" panose="02040503050406030204" pitchFamily="18" charset="0"/>
+                                                    </a:rPr>
+                                                    <m:t>𝑖𝑛</m:t>
+                                                  </m:r>
+                                                  <m:r>
+                                                    <m:rPr>
+                                                      <m:brk m:alnAt="7"/>
+                                                    </m:rPr>
+                                                    <a:rPr lang="ja-JP" altLang="en-US" sz="1400" i="1">
+                                                      <a:latin typeface="Cambria Math" panose="02040503050406030204" pitchFamily="18" charset="0"/>
+                                                    </a:rPr>
+                                                    <m:t>バ</m:t>
+                                                  </m:r>
+                                                  <m:r>
+                                                    <a:rPr lang="ja-JP" altLang="en-US" sz="1400" i="1">
+                                                      <a:latin typeface="Cambria Math" panose="02040503050406030204" pitchFamily="18" charset="0"/>
+                                                    </a:rPr>
+                                                    <m:t>イナリ型</m:t>
+                                                  </m:r>
+                                                </m:e>
+                                              </m:mr>
+                                              <m:mr>
+                                                <m:e>
+                                                  <m:r>
+                                                    <a:rPr lang="en-US" altLang="ja-JP" sz="1400" i="1">
+                                                      <a:latin typeface="Cambria Math" panose="02040503050406030204" pitchFamily="18" charset="0"/>
+                                                    </a:rPr>
+                                                    <m:t>𝑆𝑦𝑚𝑏𝑜𝑙</m:t>
+                                                  </m:r>
+                                                  <m:r>
+                                                    <a:rPr lang="ja-JP" altLang="en-US" sz="1400" i="1">
+                                                      <a:latin typeface="Cambria Math" panose="02040503050406030204" pitchFamily="18" charset="0"/>
+                                                    </a:rPr>
+                                                    <m:t>シンボル型</m:t>
+                                                  </m:r>
+                                                </m:e>
+                                              </m:mr>
+                                            </m:m>
+                                          </m:e>
+                                          <m:e>
+                                            <m:m>
+                                              <m:mPr>
+                                                <m:mcs>
+                                                  <m:mc>
+                                                    <m:mcPr>
+                                                      <m:count m:val="1"/>
+                                                      <m:mcJc m:val="center"/>
+                                                    </m:mcPr>
+                                                  </m:mc>
+                                                </m:mcs>
+                                                <m:ctrlPr>
+                                                  <a:rPr lang="en-US" altLang="ja-JP" sz="1400" i="1">
+                                                    <a:latin typeface="Cambria Math" panose="02040503050406030204" pitchFamily="18" charset="0"/>
+                                                  </a:rPr>
+                                                </m:ctrlPr>
+                                              </m:mPr>
+                                              <m:mr>
+                                                <m:e>
+                                                  <m:r>
+                                                    <a:rPr lang="en-US" altLang="ja-JP" sz="1400" i="1">
+                                                      <a:latin typeface="Cambria Math" panose="02040503050406030204" pitchFamily="18" charset="0"/>
+                                                    </a:rPr>
+                                                    <m:t>𝐹𝑢𝑛𝑐</m:t>
+                                                  </m:r>
+                                                  <m:r>
+                                                    <a:rPr lang="ja-JP" altLang="en-US" sz="1400" i="1">
+                                                      <a:latin typeface="Cambria Math" panose="02040503050406030204" pitchFamily="18" charset="0"/>
+                                                    </a:rPr>
+                                                    <m:t>関数型</m:t>
+                                                  </m:r>
+                                                </m:e>
+                                              </m:mr>
+                                              <m:mr>
+                                                <m:e>
+                                                  <m:r>
+                                                    <a:rPr lang="en-US" altLang="ja-JP" sz="1400" i="1">
+                                                      <a:latin typeface="Cambria Math" panose="02040503050406030204" pitchFamily="18" charset="0"/>
+                                                    </a:rPr>
+                                                    <m:t>𝑃𝑡𝑟</m:t>
+                                                  </m:r>
+                                                  <m:r>
+                                                    <a:rPr lang="ja-JP" altLang="en-US" sz="1400" i="1">
+                                                      <a:latin typeface="Cambria Math" panose="02040503050406030204" pitchFamily="18" charset="0"/>
+                                                    </a:rPr>
+                                                    <m:t>ポインタ型</m:t>
+                                                  </m:r>
+                                                </m:e>
+                                              </m:mr>
+                                            </m:m>
+                                          </m:e>
+                                        </m:eqArr>
+                                      </m:e>
+                                    </m:d>
+                                  </m:e>
+                                </m:mr>
+                                <m:mr>
+                                  <m:e>
+                                    <m:d>
+                                      <m:dPr>
+                                        <m:begChr m:val="{"/>
+                                        <m:endChr m:val=""/>
+                                        <m:ctrlPr>
+                                          <a:rPr lang="en-US" altLang="ja-JP" sz="1400" i="1">
+                                            <a:latin typeface="Cambria Math" panose="02040503050406030204" pitchFamily="18" charset="0"/>
+                                          </a:rPr>
+                                        </m:ctrlPr>
+                                      </m:dPr>
+                                      <m:e>
+                                        <m:eqArr>
+                                          <m:eqArrPr>
+                                            <m:ctrlPr>
+                                              <a:rPr lang="en-US" altLang="ja-JP" sz="1400" i="1">
+                                                <a:latin typeface="Cambria Math" panose="02040503050406030204" pitchFamily="18" charset="0"/>
+                                              </a:rPr>
+                                            </m:ctrlPr>
+                                          </m:eqArrPr>
+                                          <m:e>
+                                            <m:r>
+                                              <a:rPr lang="en-US" altLang="ja-JP" sz="1400" i="1">
+                                                <a:latin typeface="Cambria Math" panose="02040503050406030204" pitchFamily="18" charset="0"/>
+                                              </a:rPr>
+                                              <m:t>(</m:t>
+                                            </m:r>
+                                            <m:r>
+                                              <a:rPr lang="en-US" altLang="ja-JP" sz="1400" i="1">
+                                                <a:latin typeface="Cambria Math" panose="02040503050406030204" pitchFamily="18" charset="0"/>
+                                              </a:rPr>
+                                              <m:t>𝑡𝑎</m:t>
+                                            </m:r>
+                                            <m:r>
+                                              <a:rPr lang="en-US" altLang="ja-JP" sz="1400" i="1">
+                                                <a:latin typeface="Cambria Math" panose="02040503050406030204" pitchFamily="18" charset="0"/>
+                                              </a:rPr>
+                                              <m:t>,</m:t>
+                                            </m:r>
+                                            <m:r>
+                                              <a:rPr lang="en-US" altLang="ja-JP" sz="1400" i="1">
+                                                <a:latin typeface="Cambria Math" panose="02040503050406030204" pitchFamily="18" charset="0"/>
+                                              </a:rPr>
+                                              <m:t>𝑡𝑏</m:t>
+                                            </m:r>
+                                            <m:r>
+                                              <a:rPr lang="en-US" altLang="ja-JP" sz="1400" i="1">
+                                                <a:latin typeface="Cambria Math" panose="02040503050406030204" pitchFamily="18" charset="0"/>
+                                              </a:rPr>
+                                              <m:t>,</m:t>
+                                            </m:r>
+                                            <m:r>
+                                              <a:rPr lang="en-US" altLang="ja-JP" sz="1400" i="1">
+                                                <a:latin typeface="Cambria Math" panose="02040503050406030204" pitchFamily="18" charset="0"/>
+                                              </a:rPr>
+                                              <m:t>𝑡𝑐</m:t>
+                                            </m:r>
+                                            <m:r>
+                                              <a:rPr lang="en-US" altLang="ja-JP" sz="1400" i="1">
+                                                <a:latin typeface="Cambria Math" panose="02040503050406030204" pitchFamily="18" charset="0"/>
+                                              </a:rPr>
+                                              <m:t>)</m:t>
+                                            </m:r>
+                                            <m:r>
+                                              <a:rPr lang="ja-JP" altLang="en-US" sz="1400" i="1">
+                                                <a:latin typeface="Cambria Math" panose="02040503050406030204" pitchFamily="18" charset="0"/>
+                                              </a:rPr>
+                                              <m:t>列挙型</m:t>
+                                            </m:r>
+                                          </m:e>
+                                          <m:e>
+                                            <m:r>
+                                              <a:rPr lang="ja-JP" altLang="en-US" sz="1400" i="1">
+                                                <a:latin typeface="Cambria Math" panose="02040503050406030204" pitchFamily="18" charset="0"/>
+                                              </a:rPr>
+                                              <m:t>匿名型</m:t>
+                                            </m:r>
+                                          </m:e>
+                                        </m:eqArr>
+                                      </m:e>
+                                    </m:d>
+                                  </m:e>
+                                </m:mr>
+                              </m:m>
+                            </m:e>
+                          </m:eqArr>
+                        </m:e>
+                      </m:d>
+                    </m:oMath>
+                  </m:oMathPara>
+                </a14:m>
+                <a:endParaRPr lang="ja-JP" altLang="en-US" sz="1400" dirty="0"/>
+              </a:p>
+            </p:txBody>
+          </p:sp>
+        </mc:Choice>
+        <mc:Fallback>
+          <p:sp>
+            <p:nvSpPr>
+              <p:cNvPr id="2" name="テキスト ボックス 1">
+                <a:extLst>
+                  <a:ext uri="{FF2B5EF4-FFF2-40B4-BE49-F238E27FC236}">
+                    <a16:creationId xmlns:a16="http://schemas.microsoft.com/office/drawing/2014/main" id="{F11CC1F2-89DF-4D48-8996-97FF02999196}"/>
+                  </a:ext>
+                </a:extLst>
+              </p:cNvPr>
+              <p:cNvSpPr txBox="1">
+                <a:spLocks noRot="1" noChangeAspect="1" noMove="1" noResize="1" noEditPoints="1" noAdjustHandles="1" noChangeArrowheads="1" noChangeShapeType="1" noTextEdit="1"/>
+              </p:cNvSpPr>
+              <p:nvPr/>
+            </p:nvSpPr>
+            <p:spPr>
+              <a:xfrm>
+                <a:off x="1686561" y="218879"/>
+                <a:ext cx="8900159" cy="3563861"/>
+              </a:xfrm>
+              <a:prstGeom prst="rect">
+                <a:avLst/>
+              </a:prstGeom>
+              <a:blipFill>
+                <a:blip r:embed="rId2"/>
+                <a:stretch>
+                  <a:fillRect l="-68"/>
+                </a:stretch>
+              </a:blipFill>
+            </p:spPr>
+            <p:txBody>
+              <a:bodyPr/>
+              <a:lstStyle/>
+              <a:p>
+                <a:r>
+                  <a:rPr lang="ja-JP" altLang="en-US">
+                    <a:noFill/>
+                  </a:rPr>
+                  <a:t> </a:t>
+                </a:r>
+              </a:p>
+            </p:txBody>
+          </p:sp>
+        </mc:Fallback>
+      </mc:AlternateContent>
+    </p:spTree>
+    <p:extLst>
+      <p:ext uri="{BB962C8B-B14F-4D97-AF65-F5344CB8AC3E}">
+        <p14:creationId xmlns:p14="http://schemas.microsoft.com/office/powerpoint/2010/main" val="393764686"/>
       </p:ext>
     </p:extLst>
   </p:cSld>

</xml_diff>